<commit_message>
Se agregaron nuevos puntos
</commit_message>
<xml_diff>
--- a/Sexto Trimestre/PresentacionV6 terminar- 1012.pptx
+++ b/Sexto Trimestre/PresentacionV6 terminar- 1012.pptx
@@ -42,25 +42,25 @@
     <p:sldId id="401" r:id="rId30"/>
     <p:sldId id="402" r:id="rId31"/>
     <p:sldId id="403" r:id="rId32"/>
-    <p:sldId id="391" r:id="rId33"/>
-    <p:sldId id="392" r:id="rId34"/>
-    <p:sldId id="393" r:id="rId35"/>
-    <p:sldId id="394" r:id="rId36"/>
-    <p:sldId id="390" r:id="rId37"/>
-    <p:sldId id="360" r:id="rId38"/>
-    <p:sldId id="395" r:id="rId39"/>
-    <p:sldId id="396" r:id="rId40"/>
-    <p:sldId id="372" r:id="rId41"/>
-    <p:sldId id="397" r:id="rId42"/>
-    <p:sldId id="398" r:id="rId43"/>
-    <p:sldId id="367" r:id="rId44"/>
-    <p:sldId id="369" r:id="rId45"/>
-    <p:sldId id="399" r:id="rId46"/>
-    <p:sldId id="400" r:id="rId47"/>
-    <p:sldId id="363" r:id="rId48"/>
-    <p:sldId id="365" r:id="rId49"/>
-    <p:sldId id="366" r:id="rId50"/>
-    <p:sldId id="368" r:id="rId51"/>
+    <p:sldId id="404" r:id="rId33"/>
+    <p:sldId id="391" r:id="rId34"/>
+    <p:sldId id="392" r:id="rId35"/>
+    <p:sldId id="393" r:id="rId36"/>
+    <p:sldId id="394" r:id="rId37"/>
+    <p:sldId id="390" r:id="rId38"/>
+    <p:sldId id="360" r:id="rId39"/>
+    <p:sldId id="395" r:id="rId40"/>
+    <p:sldId id="396" r:id="rId41"/>
+    <p:sldId id="372" r:id="rId42"/>
+    <p:sldId id="397" r:id="rId43"/>
+    <p:sldId id="398" r:id="rId44"/>
+    <p:sldId id="367" r:id="rId45"/>
+    <p:sldId id="369" r:id="rId46"/>
+    <p:sldId id="399" r:id="rId47"/>
+    <p:sldId id="400" r:id="rId48"/>
+    <p:sldId id="363" r:id="rId49"/>
+    <p:sldId id="365" r:id="rId50"/>
+    <p:sldId id="366" r:id="rId51"/>
     <p:sldId id="370" r:id="rId52"/>
     <p:sldId id="371" r:id="rId53"/>
   </p:sldIdLst>
@@ -284,7 +284,7 @@
           <a:p>
             <a:fld id="{4E4206E0-8F38-491F-8DD8-9DEF31DAB11E}" type="datetimeFigureOut">
               <a:rPr lang="es-CO" smtClean="0"/>
-              <a:t>29/06/2017</a:t>
+              <a:t>03/08/2017</a:t>
             </a:fld>
             <a:endParaRPr lang="es-CO"/>
           </a:p>
@@ -449,7 +449,7 @@
           <a:p>
             <a:fld id="{AE7E15B5-955E-4B5B-9E1F-B3C4B4C6AE0C}" type="datetimeFigureOut">
               <a:rPr lang="es-CO" smtClean="0"/>
-              <a:t>29/06/2017</a:t>
+              <a:t>03/08/2017</a:t>
             </a:fld>
             <a:endParaRPr lang="es-CO"/>
           </a:p>
@@ -1213,7 +1213,7 @@
           <a:p>
             <a:fld id="{483D03DC-5ED8-7A42-A55E-C10C004AFC42}" type="datetimeFigureOut">
               <a:rPr lang="es-ES" smtClean="0"/>
-              <a:t>29/06/2017</a:t>
+              <a:t>03/08/2017</a:t>
             </a:fld>
             <a:endParaRPr lang="es-ES"/>
           </a:p>
@@ -1882,7 +1882,7 @@
           <a:p>
             <a:fld id="{483D03DC-5ED8-7A42-A55E-C10C004AFC42}" type="datetimeFigureOut">
               <a:rPr lang="es-ES" smtClean="0"/>
-              <a:t>29/06/2017</a:t>
+              <a:t>03/08/2017</a:t>
             </a:fld>
             <a:endParaRPr lang="es-ES" dirty="0"/>
           </a:p>
@@ -2041,7 +2041,7 @@
           <a:p>
             <a:fld id="{483D03DC-5ED8-7A42-A55E-C10C004AFC42}" type="datetimeFigureOut">
               <a:rPr lang="es-ES" smtClean="0"/>
-              <a:t>29/06/2017</a:t>
+              <a:t>03/08/2017</a:t>
             </a:fld>
             <a:endParaRPr lang="es-ES"/>
           </a:p>
@@ -2571,7 +2571,7 @@
           <a:p>
             <a:fld id="{483D03DC-5ED8-7A42-A55E-C10C004AFC42}" type="datetimeFigureOut">
               <a:rPr lang="es-ES" smtClean="0"/>
-              <a:t>29/06/2017</a:t>
+              <a:t>03/08/2017</a:t>
             </a:fld>
             <a:endParaRPr lang="es-ES"/>
           </a:p>
@@ -3104,7 +3104,7 @@
           <a:p>
             <a:fld id="{483D03DC-5ED8-7A42-A55E-C10C004AFC42}" type="datetimeFigureOut">
               <a:rPr lang="es-ES" smtClean="0"/>
-              <a:t>29/06/2017</a:t>
+              <a:t>03/08/2017</a:t>
             </a:fld>
             <a:endParaRPr lang="es-ES"/>
           </a:p>
@@ -3334,7 +3334,7 @@
           <a:p>
             <a:fld id="{483D03DC-5ED8-7A42-A55E-C10C004AFC42}" type="datetimeFigureOut">
               <a:rPr lang="es-ES" smtClean="0"/>
-              <a:t>29/06/2017</a:t>
+              <a:t>03/08/2017</a:t>
             </a:fld>
             <a:endParaRPr lang="es-ES"/>
           </a:p>
@@ -4012,7 +4012,7 @@
           <a:p>
             <a:fld id="{483D03DC-5ED8-7A42-A55E-C10C004AFC42}" type="datetimeFigureOut">
               <a:rPr lang="es-ES" smtClean="0"/>
-              <a:t>29/06/2017</a:t>
+              <a:t>03/08/2017</a:t>
             </a:fld>
             <a:endParaRPr lang="es-ES" dirty="0"/>
           </a:p>
@@ -4107,7 +4107,7 @@
           <a:p>
             <a:fld id="{483D03DC-5ED8-7A42-A55E-C10C004AFC42}" type="datetimeFigureOut">
               <a:rPr lang="es-ES" smtClean="0"/>
-              <a:t>29/06/2017</a:t>
+              <a:t>03/08/2017</a:t>
             </a:fld>
             <a:endParaRPr lang="es-ES"/>
           </a:p>
@@ -4652,7 +4652,7 @@
           <a:p>
             <a:fld id="{483D03DC-5ED8-7A42-A55E-C10C004AFC42}" type="datetimeFigureOut">
               <a:rPr lang="es-ES" smtClean="0"/>
-              <a:t>29/06/2017</a:t>
+              <a:t>03/08/2017</a:t>
             </a:fld>
             <a:endParaRPr lang="es-ES"/>
           </a:p>
@@ -5569,7 +5569,7 @@
           <a:p>
             <a:fld id="{483D03DC-5ED8-7A42-A55E-C10C004AFC42}" type="datetimeFigureOut">
               <a:rPr lang="es-ES" smtClean="0"/>
-              <a:t>29/06/2017</a:t>
+              <a:t>03/08/2017</a:t>
             </a:fld>
             <a:endParaRPr lang="es-ES" dirty="0"/>
           </a:p>
@@ -5728,7 +5728,7 @@
           <a:p>
             <a:fld id="{483D03DC-5ED8-7A42-A55E-C10C004AFC42}" type="datetimeFigureOut">
               <a:rPr lang="es-ES" smtClean="0"/>
-              <a:t>29/06/2017</a:t>
+              <a:t>03/08/2017</a:t>
             </a:fld>
             <a:endParaRPr lang="es-ES"/>
           </a:p>
@@ -6258,7 +6258,7 @@
           <a:p>
             <a:fld id="{483D03DC-5ED8-7A42-A55E-C10C004AFC42}" type="datetimeFigureOut">
               <a:rPr lang="es-ES" smtClean="0"/>
-              <a:t>29/06/2017</a:t>
+              <a:t>03/08/2017</a:t>
             </a:fld>
             <a:endParaRPr lang="es-ES"/>
           </a:p>
@@ -6817,7 +6817,7 @@
           <a:p>
             <a:fld id="{483D03DC-5ED8-7A42-A55E-C10C004AFC42}" type="datetimeFigureOut">
               <a:rPr lang="es-ES" smtClean="0"/>
-              <a:t>29/06/2017</a:t>
+              <a:t>03/08/2017</a:t>
             </a:fld>
             <a:endParaRPr lang="es-ES"/>
           </a:p>
@@ -10159,36 +10159,6 @@
           <a:chExt cx="0" cy="0"/>
         </a:xfrm>
       </p:grpSpPr>
-      <p:pic>
-        <p:nvPicPr>
-          <p:cNvPr id="2" name="Imagen 1"/>
-          <p:cNvPicPr>
-            <a:picLocks noChangeAspect="1"/>
-          </p:cNvPicPr>
-          <p:nvPr/>
-        </p:nvPicPr>
-        <p:blipFill>
-          <a:blip r:embed="rId2">
-            <a:extLst>
-              <a:ext uri="{28A0092B-C50C-407E-A947-70E740481C1C}">
-                <a14:useLocalDpi xmlns:a14="http://schemas.microsoft.com/office/drawing/2010/main" val="0"/>
-              </a:ext>
-            </a:extLst>
-          </a:blip>
-          <a:stretch>
-            <a:fillRect/>
-          </a:stretch>
-        </p:blipFill>
-        <p:spPr>
-          <a:xfrm>
-            <a:off x="0" y="2292783"/>
-            <a:ext cx="9144000" cy="3574014"/>
-          </a:xfrm>
-          <a:prstGeom prst="rect">
-            <a:avLst/>
-          </a:prstGeom>
-        </p:spPr>
-      </p:pic>
       <p:sp>
         <p:nvSpPr>
           <p:cNvPr id="3" name="CuadroTexto 2"/>
@@ -10219,6 +10189,74 @@
               </a:rPr>
               <a:t>Casos de uso</a:t>
             </a:r>
+          </a:p>
+        </p:txBody>
+      </p:sp>
+      <p:sp>
+        <p:nvSpPr>
+          <p:cNvPr id="4" name="CuadroTexto 3"/>
+          <p:cNvSpPr txBox="1"/>
+          <p:nvPr/>
+        </p:nvSpPr>
+        <p:spPr>
+          <a:xfrm>
+            <a:off x="3775166" y="2978331"/>
+            <a:ext cx="1227908" cy="613955"/>
+          </a:xfrm>
+          <a:prstGeom prst="rect">
+            <a:avLst/>
+          </a:prstGeom>
+        </p:spPr>
+        <p:txBody>
+          <a:bodyPr vert="horz" wrap="square" lIns="91440" tIns="45720" rIns="91440" bIns="45720" rtlCol="0" anchor="ctr">
+            <a:noAutofit/>
+          </a:bodyPr>
+          <a:lstStyle/>
+          <a:p>
+            <a:pPr algn="l"/>
+            <a:endParaRPr lang="es-CO" sz="8000" b="1" dirty="0" smtClean="0">
+              <a:solidFill>
+                <a:srgbClr val="92D050"/>
+              </a:solidFill>
+            </a:endParaRPr>
+          </a:p>
+        </p:txBody>
+      </p:sp>
+      <p:sp>
+        <p:nvSpPr>
+          <p:cNvPr id="5" name="CuadroTexto 4"/>
+          <p:cNvSpPr txBox="1"/>
+          <p:nvPr/>
+        </p:nvSpPr>
+        <p:spPr>
+          <a:xfrm>
+            <a:off x="2658291" y="3285308"/>
+            <a:ext cx="4689565" cy="1417321"/>
+          </a:xfrm>
+          <a:prstGeom prst="rect">
+            <a:avLst/>
+          </a:prstGeom>
+        </p:spPr>
+        <p:txBody>
+          <a:bodyPr vert="horz" wrap="square" lIns="91440" tIns="45720" rIns="91440" bIns="45720" rtlCol="0" anchor="ctr">
+            <a:noAutofit/>
+          </a:bodyPr>
+          <a:lstStyle/>
+          <a:p>
+            <a:pPr algn="l"/>
+            <a:r>
+              <a:rPr lang="es-CO" sz="8000" b="1" dirty="0" smtClean="0">
+                <a:solidFill>
+                  <a:srgbClr val="92D050"/>
+                </a:solidFill>
+              </a:rPr>
+              <a:t>Pendiente</a:t>
+            </a:r>
+            <a:endParaRPr lang="es-CO" sz="8000" b="1" dirty="0" smtClean="0">
+              <a:solidFill>
+                <a:srgbClr val="92D050"/>
+              </a:solidFill>
+            </a:endParaRPr>
           </a:p>
         </p:txBody>
       </p:sp>
@@ -10377,62 +10415,69 @@
           <a:chExt cx="0" cy="0"/>
         </a:xfrm>
       </p:grpSpPr>
+      <p:sp>
+        <p:nvSpPr>
+          <p:cNvPr id="3" name="CuadroTexto 2"/>
+          <p:cNvSpPr txBox="1"/>
+          <p:nvPr/>
+        </p:nvSpPr>
+        <p:spPr>
+          <a:xfrm>
+            <a:off x="1112623" y="428368"/>
+            <a:ext cx="6663896" cy="840259"/>
+          </a:xfrm>
+          <a:prstGeom prst="rect">
+            <a:avLst/>
+          </a:prstGeom>
+        </p:spPr>
+        <p:txBody>
+          <a:bodyPr vert="horz" wrap="square" lIns="91440" tIns="45720" rIns="91440" bIns="45720" rtlCol="0" anchor="ctr">
+            <a:noAutofit/>
+          </a:bodyPr>
+          <a:lstStyle/>
+          <a:p>
+            <a:pPr algn="ctr"/>
+            <a:r>
+              <a:rPr lang="es-ES" sz="5000" b="1" dirty="0" smtClean="0">
+                <a:solidFill>
+                  <a:srgbClr val="92D050"/>
+                </a:solidFill>
+              </a:rPr>
+              <a:t>Modelo Relacional (MR)</a:t>
+            </a:r>
+          </a:p>
+        </p:txBody>
+      </p:sp>
       <p:pic>
         <p:nvPicPr>
-          <p:cNvPr id="2" name="Imagen 1"/>
+          <p:cNvPr id="4" name="Imagen 3"/>
           <p:cNvPicPr>
             <a:picLocks noChangeAspect="1"/>
           </p:cNvPicPr>
           <p:nvPr/>
         </p:nvPicPr>
-        <p:blipFill rotWithShape="1">
-          <a:blip r:embed="rId2"/>
-          <a:srcRect l="1532" t="701" r="1759" b="4175"/>
-          <a:stretch/>
+        <p:blipFill>
+          <a:blip r:embed="rId2">
+            <a:extLst>
+              <a:ext uri="{28A0092B-C50C-407E-A947-70E740481C1C}">
+                <a14:useLocalDpi xmlns:a14="http://schemas.microsoft.com/office/drawing/2010/main" val="0"/>
+              </a:ext>
+            </a:extLst>
+          </a:blip>
+          <a:stretch>
+            <a:fillRect/>
+          </a:stretch>
         </p:blipFill>
         <p:spPr>
           <a:xfrm>
-            <a:off x="1219200" y="2166550"/>
-            <a:ext cx="7249298" cy="4349579"/>
+            <a:off x="0" y="1718538"/>
+            <a:ext cx="9144000" cy="5406478"/>
           </a:xfrm>
           <a:prstGeom prst="rect">
             <a:avLst/>
           </a:prstGeom>
         </p:spPr>
       </p:pic>
-      <p:sp>
-        <p:nvSpPr>
-          <p:cNvPr id="3" name="CuadroTexto 2"/>
-          <p:cNvSpPr txBox="1"/>
-          <p:nvPr/>
-        </p:nvSpPr>
-        <p:spPr>
-          <a:xfrm>
-            <a:off x="1112623" y="428368"/>
-            <a:ext cx="6663896" cy="840259"/>
-          </a:xfrm>
-          <a:prstGeom prst="rect">
-            <a:avLst/>
-          </a:prstGeom>
-        </p:spPr>
-        <p:txBody>
-          <a:bodyPr vert="horz" wrap="square" lIns="91440" tIns="45720" rIns="91440" bIns="45720" rtlCol="0" anchor="ctr">
-            <a:noAutofit/>
-          </a:bodyPr>
-          <a:lstStyle/>
-          <a:p>
-            <a:pPr algn="ctr"/>
-            <a:r>
-              <a:rPr lang="es-ES" sz="5000" b="1" dirty="0" smtClean="0">
-                <a:solidFill>
-                  <a:srgbClr val="92D050"/>
-                </a:solidFill>
-              </a:rPr>
-              <a:t>Modelo Relacional (MR)</a:t>
-            </a:r>
-          </a:p>
-        </p:txBody>
-      </p:sp>
     </p:spTree>
     <p:extLst>
       <p:ext uri="{BB962C8B-B14F-4D97-AF65-F5344CB8AC3E}">
@@ -10478,7 +10523,7 @@
         </p:nvSpPr>
         <p:spPr>
           <a:xfrm>
-            <a:off x="1458097" y="436606"/>
+            <a:off x="1458097" y="449669"/>
             <a:ext cx="6112476" cy="757881"/>
           </a:xfrm>
           <a:prstGeom prst="rect">
@@ -10505,7 +10550,7 @@
       </p:sp>
       <p:pic>
         <p:nvPicPr>
-          <p:cNvPr id="6" name="Imagen 5"/>
+          <p:cNvPr id="2" name="Imagen 1"/>
           <p:cNvPicPr>
             <a:picLocks noChangeAspect="1"/>
           </p:cNvPicPr>
@@ -10519,8 +10564,8 @@
         </p:blipFill>
         <p:spPr>
           <a:xfrm>
-            <a:off x="106018" y="1612002"/>
-            <a:ext cx="9037982" cy="1990725"/>
+            <a:off x="849244" y="1604623"/>
+            <a:ext cx="7330181" cy="2482742"/>
           </a:xfrm>
           <a:prstGeom prst="rect">
             <a:avLst/>
@@ -10529,7 +10574,7 @@
       </p:pic>
       <p:pic>
         <p:nvPicPr>
-          <p:cNvPr id="7" name="Imagen 6"/>
+          <p:cNvPr id="4" name="Imagen 3"/>
           <p:cNvPicPr>
             <a:picLocks noChangeAspect="1"/>
           </p:cNvPicPr>
@@ -10543,8 +10588,8 @@
         </p:blipFill>
         <p:spPr>
           <a:xfrm>
-            <a:off x="106018" y="3780147"/>
-            <a:ext cx="9037982" cy="2979048"/>
+            <a:off x="849245" y="4087365"/>
+            <a:ext cx="7330180" cy="2705165"/>
           </a:xfrm>
           <a:prstGeom prst="rect">
             <a:avLst/>
@@ -10623,7 +10668,7 @@
       </p:sp>
       <p:pic>
         <p:nvPicPr>
-          <p:cNvPr id="5" name="Imagen 4"/>
+          <p:cNvPr id="2" name="Imagen 1"/>
           <p:cNvPicPr>
             <a:picLocks noChangeAspect="1"/>
           </p:cNvPicPr>
@@ -10637,8 +10682,32 @@
         </p:blipFill>
         <p:spPr>
           <a:xfrm>
-            <a:off x="543340" y="1570589"/>
-            <a:ext cx="8295860" cy="4570904"/>
+            <a:off x="-66675" y="1543594"/>
+            <a:ext cx="9277350" cy="3352800"/>
+          </a:xfrm>
+          <a:prstGeom prst="rect">
+            <a:avLst/>
+          </a:prstGeom>
+        </p:spPr>
+      </p:pic>
+      <p:pic>
+        <p:nvPicPr>
+          <p:cNvPr id="3" name="Imagen 2"/>
+          <p:cNvPicPr>
+            <a:picLocks noChangeAspect="1"/>
+          </p:cNvPicPr>
+          <p:nvPr/>
+        </p:nvPicPr>
+        <p:blipFill>
+          <a:blip r:embed="rId3"/>
+          <a:stretch>
+            <a:fillRect/>
+          </a:stretch>
+        </p:blipFill>
+        <p:spPr>
+          <a:xfrm>
+            <a:off x="0" y="5010967"/>
+            <a:ext cx="9286875" cy="1695450"/>
           </a:xfrm>
           <a:prstGeom prst="rect">
             <a:avLst/>
@@ -10684,7 +10753,7 @@
       </p:grpSpPr>
       <p:pic>
         <p:nvPicPr>
-          <p:cNvPr id="2" name="Imagen 1"/>
+          <p:cNvPr id="4" name="Imagen 3"/>
           <p:cNvPicPr>
             <a:picLocks noChangeAspect="1"/>
           </p:cNvPicPr>
@@ -10698,17 +10767,50 @@
         </p:blipFill>
         <p:spPr>
           <a:xfrm>
-            <a:off x="202716" y="1661283"/>
-            <a:ext cx="8879401" cy="1737010"/>
+            <a:off x="-80963" y="1643062"/>
+            <a:ext cx="9305925" cy="2657475"/>
           </a:xfrm>
           <a:prstGeom prst="rect">
             <a:avLst/>
           </a:prstGeom>
         </p:spPr>
       </p:pic>
+      <p:sp>
+        <p:nvSpPr>
+          <p:cNvPr id="5" name="CuadroTexto 4"/>
+          <p:cNvSpPr txBox="1"/>
+          <p:nvPr/>
+        </p:nvSpPr>
+        <p:spPr>
+          <a:xfrm>
+            <a:off x="1458097" y="436606"/>
+            <a:ext cx="6112476" cy="757881"/>
+          </a:xfrm>
+          <a:prstGeom prst="rect">
+            <a:avLst/>
+          </a:prstGeom>
+        </p:spPr>
+        <p:txBody>
+          <a:bodyPr vert="horz" wrap="square" lIns="91440" tIns="45720" rIns="91440" bIns="45720" rtlCol="0" anchor="ctr">
+            <a:noAutofit/>
+          </a:bodyPr>
+          <a:lstStyle/>
+          <a:p>
+            <a:pPr algn="l"/>
+            <a:r>
+              <a:rPr lang="es-ES" sz="5000" b="1" dirty="0" smtClean="0">
+                <a:solidFill>
+                  <a:srgbClr val="92D050"/>
+                </a:solidFill>
+              </a:rPr>
+              <a:t>Diccionario de datos </a:t>
+            </a:r>
+          </a:p>
+        </p:txBody>
+      </p:sp>
       <p:pic>
         <p:nvPicPr>
-          <p:cNvPr id="3" name="Imagen 2"/>
+          <p:cNvPr id="6" name="Imagen 5"/>
           <p:cNvPicPr>
             <a:picLocks noChangeAspect="1"/>
           </p:cNvPicPr>
@@ -10722,8 +10824,8 @@
         </p:blipFill>
         <p:spPr>
           <a:xfrm>
-            <a:off x="202715" y="3616572"/>
-            <a:ext cx="8879401" cy="2979576"/>
+            <a:off x="-71438" y="4300537"/>
+            <a:ext cx="9296400" cy="2657475"/>
           </a:xfrm>
           <a:prstGeom prst="rect">
             <a:avLst/>
@@ -10938,7 +11040,7 @@
       </p:grpSpPr>
       <p:pic>
         <p:nvPicPr>
-          <p:cNvPr id="2" name="Imagen 1"/>
+          <p:cNvPr id="5" name="Imagen 4"/>
           <p:cNvPicPr>
             <a:picLocks noChangeAspect="1"/>
           </p:cNvPicPr>
@@ -10952,8 +11054,8 @@
         </p:blipFill>
         <p:spPr>
           <a:xfrm>
-            <a:off x="219695" y="1643813"/>
-            <a:ext cx="8637702" cy="2133600"/>
+            <a:off x="237308" y="1513288"/>
+            <a:ext cx="8684623" cy="2954209"/>
           </a:xfrm>
           <a:prstGeom prst="rect">
             <a:avLst/>
@@ -10962,7 +11064,7 @@
       </p:pic>
       <p:pic>
         <p:nvPicPr>
-          <p:cNvPr id="3" name="Imagen 2"/>
+          <p:cNvPr id="6" name="Imagen 5"/>
           <p:cNvPicPr>
             <a:picLocks noChangeAspect="1"/>
           </p:cNvPicPr>
@@ -10976,14 +11078,47 @@
         </p:blipFill>
         <p:spPr>
           <a:xfrm>
-            <a:off x="219696" y="3777413"/>
-            <a:ext cx="8637702" cy="2895600"/>
+            <a:off x="237308" y="4467496"/>
+            <a:ext cx="8684623" cy="2390503"/>
           </a:xfrm>
           <a:prstGeom prst="rect">
             <a:avLst/>
           </a:prstGeom>
         </p:spPr>
       </p:pic>
+      <p:sp>
+        <p:nvSpPr>
+          <p:cNvPr id="7" name="CuadroTexto 6"/>
+          <p:cNvSpPr txBox="1"/>
+          <p:nvPr/>
+        </p:nvSpPr>
+        <p:spPr>
+          <a:xfrm>
+            <a:off x="1458097" y="436606"/>
+            <a:ext cx="6112476" cy="757881"/>
+          </a:xfrm>
+          <a:prstGeom prst="rect">
+            <a:avLst/>
+          </a:prstGeom>
+        </p:spPr>
+        <p:txBody>
+          <a:bodyPr vert="horz" wrap="square" lIns="91440" tIns="45720" rIns="91440" bIns="45720" rtlCol="0" anchor="ctr">
+            <a:noAutofit/>
+          </a:bodyPr>
+          <a:lstStyle/>
+          <a:p>
+            <a:pPr algn="l"/>
+            <a:r>
+              <a:rPr lang="es-ES" sz="5000" b="1" dirty="0" smtClean="0">
+                <a:solidFill>
+                  <a:srgbClr val="92D050"/>
+                </a:solidFill>
+              </a:rPr>
+              <a:t>Diccionario de datos </a:t>
+            </a:r>
+          </a:p>
+        </p:txBody>
+      </p:sp>
     </p:spTree>
     <p:extLst>
       <p:ext uri="{BB962C8B-B14F-4D97-AF65-F5344CB8AC3E}">
@@ -11014,9 +11149,42 @@
           <a:chExt cx="0" cy="0"/>
         </a:xfrm>
       </p:grpSpPr>
+      <p:sp>
+        <p:nvSpPr>
+          <p:cNvPr id="4" name="CuadroTexto 3"/>
+          <p:cNvSpPr txBox="1"/>
+          <p:nvPr/>
+        </p:nvSpPr>
+        <p:spPr>
+          <a:xfrm>
+            <a:off x="1458097" y="436606"/>
+            <a:ext cx="6112476" cy="757881"/>
+          </a:xfrm>
+          <a:prstGeom prst="rect">
+            <a:avLst/>
+          </a:prstGeom>
+        </p:spPr>
+        <p:txBody>
+          <a:bodyPr vert="horz" wrap="square" lIns="91440" tIns="45720" rIns="91440" bIns="45720" rtlCol="0" anchor="ctr">
+            <a:noAutofit/>
+          </a:bodyPr>
+          <a:lstStyle/>
+          <a:p>
+            <a:pPr algn="l"/>
+            <a:r>
+              <a:rPr lang="es-ES" sz="5000" b="1" dirty="0" smtClean="0">
+                <a:solidFill>
+                  <a:srgbClr val="92D050"/>
+                </a:solidFill>
+              </a:rPr>
+              <a:t>Diccionario de datos </a:t>
+            </a:r>
+          </a:p>
+        </p:txBody>
+      </p:sp>
       <p:pic>
         <p:nvPicPr>
-          <p:cNvPr id="2" name="Imagen 1"/>
+          <p:cNvPr id="5" name="Imagen 4"/>
           <p:cNvPicPr>
             <a:picLocks noChangeAspect="1"/>
           </p:cNvPicPr>
@@ -11030,8 +11198,8 @@
         </p:blipFill>
         <p:spPr>
           <a:xfrm>
-            <a:off x="149707" y="1740797"/>
-            <a:ext cx="8961293" cy="1753030"/>
+            <a:off x="182880" y="1611630"/>
+            <a:ext cx="8856617" cy="2202724"/>
           </a:xfrm>
           <a:prstGeom prst="rect">
             <a:avLst/>
@@ -11040,7 +11208,7 @@
       </p:pic>
       <p:pic>
         <p:nvPicPr>
-          <p:cNvPr id="3" name="Imagen 2"/>
+          <p:cNvPr id="6" name="Imagen 5"/>
           <p:cNvPicPr>
             <a:picLocks noChangeAspect="1"/>
           </p:cNvPicPr>
@@ -11054,8 +11222,8 @@
         </p:blipFill>
         <p:spPr>
           <a:xfrm>
-            <a:off x="149707" y="4005049"/>
-            <a:ext cx="9017567" cy="2272921"/>
+            <a:off x="182880" y="3814354"/>
+            <a:ext cx="8856617" cy="2911941"/>
           </a:xfrm>
           <a:prstGeom prst="rect">
             <a:avLst/>
@@ -11092,6 +11260,39 @@
           <a:chExt cx="0" cy="0"/>
         </a:xfrm>
       </p:grpSpPr>
+      <p:sp>
+        <p:nvSpPr>
+          <p:cNvPr id="4" name="CuadroTexto 3"/>
+          <p:cNvSpPr txBox="1"/>
+          <p:nvPr/>
+        </p:nvSpPr>
+        <p:spPr>
+          <a:xfrm>
+            <a:off x="1458097" y="436606"/>
+            <a:ext cx="6112476" cy="757881"/>
+          </a:xfrm>
+          <a:prstGeom prst="rect">
+            <a:avLst/>
+          </a:prstGeom>
+        </p:spPr>
+        <p:txBody>
+          <a:bodyPr vert="horz" wrap="square" lIns="91440" tIns="45720" rIns="91440" bIns="45720" rtlCol="0" anchor="ctr">
+            <a:noAutofit/>
+          </a:bodyPr>
+          <a:lstStyle/>
+          <a:p>
+            <a:pPr algn="l"/>
+            <a:r>
+              <a:rPr lang="es-ES" sz="5000" b="1" dirty="0" smtClean="0">
+                <a:solidFill>
+                  <a:srgbClr val="92D050"/>
+                </a:solidFill>
+              </a:rPr>
+              <a:t>Diccionario de datos </a:t>
+            </a:r>
+          </a:p>
+        </p:txBody>
+      </p:sp>
       <p:pic>
         <p:nvPicPr>
           <p:cNvPr id="2" name="Imagen 1"/>
@@ -11108,8 +11309,8 @@
         </p:blipFill>
         <p:spPr>
           <a:xfrm>
-            <a:off x="304799" y="1856181"/>
-            <a:ext cx="8550876" cy="4789308"/>
+            <a:off x="-71438" y="2250078"/>
+            <a:ext cx="9286875" cy="1600200"/>
           </a:xfrm>
           <a:prstGeom prst="rect">
             <a:avLst/>
@@ -11119,20 +11320,13 @@
     </p:spTree>
     <p:extLst>
       <p:ext uri="{BB962C8B-B14F-4D97-AF65-F5344CB8AC3E}">
-        <p14:creationId xmlns:p14="http://schemas.microsoft.com/office/powerpoint/2010/main" val="4264181209"/>
+        <p14:creationId xmlns:p14="http://schemas.microsoft.com/office/powerpoint/2010/main" val="2034810955"/>
       </p:ext>
     </p:extLst>
   </p:cSld>
   <p:clrMapOvr>
     <a:masterClrMapping/>
   </p:clrMapOvr>
-  <p:timing>
-    <p:tnLst>
-      <p:par>
-        <p:cTn id="1" dur="indefinite" restart="never" nodeType="tmRoot"/>
-      </p:par>
-    </p:tnLst>
-  </p:timing>
 </p:sld>
 </file>
 
@@ -11169,8 +11363,8 @@
         </p:blipFill>
         <p:spPr>
           <a:xfrm>
-            <a:off x="1260132" y="1833477"/>
-            <a:ext cx="6895328" cy="4701831"/>
+            <a:off x="304799" y="1856181"/>
+            <a:ext cx="8550876" cy="4789308"/>
           </a:xfrm>
           <a:prstGeom prst="rect">
             <a:avLst/>
@@ -11180,7 +11374,7 @@
     </p:spTree>
     <p:extLst>
       <p:ext uri="{BB962C8B-B14F-4D97-AF65-F5344CB8AC3E}">
-        <p14:creationId xmlns:p14="http://schemas.microsoft.com/office/powerpoint/2010/main" val="1759512579"/>
+        <p14:creationId xmlns:p14="http://schemas.microsoft.com/office/powerpoint/2010/main" val="4264181209"/>
       </p:ext>
     </p:extLst>
   </p:cSld>
@@ -11230,8 +11424,8 @@
         </p:blipFill>
         <p:spPr>
           <a:xfrm>
-            <a:off x="472775" y="1652495"/>
-            <a:ext cx="8094576" cy="4673778"/>
+            <a:off x="1260132" y="1833477"/>
+            <a:ext cx="6895328" cy="4701831"/>
           </a:xfrm>
           <a:prstGeom prst="rect">
             <a:avLst/>
@@ -11241,7 +11435,7 @@
     </p:spTree>
     <p:extLst>
       <p:ext uri="{BB962C8B-B14F-4D97-AF65-F5344CB8AC3E}">
-        <p14:creationId xmlns:p14="http://schemas.microsoft.com/office/powerpoint/2010/main" val="397227119"/>
+        <p14:creationId xmlns:p14="http://schemas.microsoft.com/office/powerpoint/2010/main" val="1759512579"/>
       </p:ext>
     </p:extLst>
   </p:cSld>
@@ -11291,6 +11485,67 @@
         </p:blipFill>
         <p:spPr>
           <a:xfrm>
+            <a:off x="472775" y="1652495"/>
+            <a:ext cx="8094576" cy="4673778"/>
+          </a:xfrm>
+          <a:prstGeom prst="rect">
+            <a:avLst/>
+          </a:prstGeom>
+        </p:spPr>
+      </p:pic>
+    </p:spTree>
+    <p:extLst>
+      <p:ext uri="{BB962C8B-B14F-4D97-AF65-F5344CB8AC3E}">
+        <p14:creationId xmlns:p14="http://schemas.microsoft.com/office/powerpoint/2010/main" val="397227119"/>
+      </p:ext>
+    </p:extLst>
+  </p:cSld>
+  <p:clrMapOvr>
+    <a:masterClrMapping/>
+  </p:clrMapOvr>
+  <p:timing>
+    <p:tnLst>
+      <p:par>
+        <p:cTn id="1" dur="indefinite" restart="never" nodeType="tmRoot"/>
+      </p:par>
+    </p:tnLst>
+  </p:timing>
+</p:sld>
+</file>
+
+<file path=ppt/slides/slide36.xml><?xml version="1.0" encoding="utf-8"?>
+<p:sld xmlns:a="http://schemas.openxmlformats.org/drawingml/2006/main" xmlns:r="http://schemas.openxmlformats.org/officeDocument/2006/relationships" xmlns:p="http://schemas.openxmlformats.org/presentationml/2006/main">
+  <p:cSld>
+    <p:spTree>
+      <p:nvGrpSpPr>
+        <p:cNvPr id="1" name=""/>
+        <p:cNvGrpSpPr/>
+        <p:nvPr/>
+      </p:nvGrpSpPr>
+      <p:grpSpPr>
+        <a:xfrm>
+          <a:off x="0" y="0"/>
+          <a:ext cx="0" cy="0"/>
+          <a:chOff x="0" y="0"/>
+          <a:chExt cx="0" cy="0"/>
+        </a:xfrm>
+      </p:grpSpPr>
+      <p:pic>
+        <p:nvPicPr>
+          <p:cNvPr id="2" name="Imagen 1"/>
+          <p:cNvPicPr>
+            <a:picLocks noChangeAspect="1"/>
+          </p:cNvPicPr>
+          <p:nvPr/>
+        </p:nvPicPr>
+        <p:blipFill>
+          <a:blip r:embed="rId2"/>
+          <a:stretch>
+            <a:fillRect/>
+          </a:stretch>
+        </p:blipFill>
+        <p:spPr>
+          <a:xfrm>
             <a:off x="1081344" y="1667885"/>
             <a:ext cx="7222397" cy="5109152"/>
           </a:xfrm>
@@ -11319,7 +11574,7 @@
 </p:sld>
 </file>
 
-<file path=ppt/slides/slide36.xml><?xml version="1.0" encoding="utf-8"?>
+<file path=ppt/slides/slide37.xml><?xml version="1.0" encoding="utf-8"?>
 <p:sld xmlns:a="http://schemas.openxmlformats.org/drawingml/2006/main" xmlns:r="http://schemas.openxmlformats.org/officeDocument/2006/relationships" xmlns:p="http://schemas.openxmlformats.org/presentationml/2006/main">
   <p:cSld>
     <p:spTree>
@@ -11430,7 +11685,7 @@
 </p:sld>
 </file>
 
-<file path=ppt/slides/slide37.xml><?xml version="1.0" encoding="utf-8"?>
+<file path=ppt/slides/slide38.xml><?xml version="1.0" encoding="utf-8"?>
 <p:sld xmlns:a="http://schemas.openxmlformats.org/drawingml/2006/main" xmlns:r="http://schemas.openxmlformats.org/officeDocument/2006/relationships" xmlns:p="http://schemas.openxmlformats.org/presentationml/2006/main">
   <p:cSld>
     <p:spTree>
@@ -11560,103 +11815,6 @@
     <p:extLst>
       <p:ext uri="{BB962C8B-B14F-4D97-AF65-F5344CB8AC3E}">
         <p14:creationId xmlns:p14="http://schemas.microsoft.com/office/powerpoint/2010/main" val="3341388243"/>
-      </p:ext>
-    </p:extLst>
-  </p:cSld>
-  <p:clrMapOvr>
-    <a:masterClrMapping/>
-  </p:clrMapOvr>
-  <p:timing>
-    <p:tnLst>
-      <p:par>
-        <p:cTn id="1" dur="indefinite" restart="never" nodeType="tmRoot"/>
-      </p:par>
-    </p:tnLst>
-  </p:timing>
-</p:sld>
-</file>
-
-<file path=ppt/slides/slide38.xml><?xml version="1.0" encoding="utf-8"?>
-<p:sld xmlns:a="http://schemas.openxmlformats.org/drawingml/2006/main" xmlns:r="http://schemas.openxmlformats.org/officeDocument/2006/relationships" xmlns:p="http://schemas.openxmlformats.org/presentationml/2006/main">
-  <p:cSld>
-    <p:spTree>
-      <p:nvGrpSpPr>
-        <p:cNvPr id="1" name=""/>
-        <p:cNvGrpSpPr/>
-        <p:nvPr/>
-      </p:nvGrpSpPr>
-      <p:grpSpPr>
-        <a:xfrm>
-          <a:off x="0" y="0"/>
-          <a:ext cx="0" cy="0"/>
-          <a:chOff x="0" y="0"/>
-          <a:chExt cx="0" cy="0"/>
-        </a:xfrm>
-      </p:grpSpPr>
-      <p:pic>
-        <p:nvPicPr>
-          <p:cNvPr id="2" name="Imagen 1"/>
-          <p:cNvPicPr>
-            <a:picLocks noChangeAspect="1"/>
-          </p:cNvPicPr>
-          <p:nvPr/>
-        </p:nvPicPr>
-        <p:blipFill>
-          <a:blip r:embed="rId2">
-            <a:extLst>
-              <a:ext uri="{28A0092B-C50C-407E-A947-70E740481C1C}">
-                <a14:useLocalDpi xmlns:a14="http://schemas.microsoft.com/office/drawing/2010/main" val="0"/>
-              </a:ext>
-            </a:extLst>
-          </a:blip>
-          <a:stretch>
-            <a:fillRect/>
-          </a:stretch>
-        </p:blipFill>
-        <p:spPr>
-          <a:xfrm>
-            <a:off x="122795" y="1779373"/>
-            <a:ext cx="4553820" cy="3039762"/>
-          </a:xfrm>
-          <a:prstGeom prst="rect">
-            <a:avLst/>
-          </a:prstGeom>
-        </p:spPr>
-      </p:pic>
-      <p:pic>
-        <p:nvPicPr>
-          <p:cNvPr id="3" name="Imagen 2"/>
-          <p:cNvPicPr>
-            <a:picLocks noChangeAspect="1"/>
-          </p:cNvPicPr>
-          <p:nvPr/>
-        </p:nvPicPr>
-        <p:blipFill>
-          <a:blip r:embed="rId3">
-            <a:extLst>
-              <a:ext uri="{28A0092B-C50C-407E-A947-70E740481C1C}">
-                <a14:useLocalDpi xmlns:a14="http://schemas.microsoft.com/office/drawing/2010/main" val="0"/>
-              </a:ext>
-            </a:extLst>
-          </a:blip>
-          <a:stretch>
-            <a:fillRect/>
-          </a:stretch>
-        </p:blipFill>
-        <p:spPr>
-          <a:xfrm>
-            <a:off x="4343785" y="3179142"/>
-            <a:ext cx="4475439" cy="3279986"/>
-          </a:xfrm>
-          <a:prstGeom prst="rect">
-            <a:avLst/>
-          </a:prstGeom>
-        </p:spPr>
-      </p:pic>
-    </p:spTree>
-    <p:extLst>
-      <p:ext uri="{BB962C8B-B14F-4D97-AF65-F5344CB8AC3E}">
-        <p14:creationId xmlns:p14="http://schemas.microsoft.com/office/powerpoint/2010/main" val="1282878099"/>
       </p:ext>
     </p:extLst>
   </p:cSld>
@@ -11712,8 +11870,8 @@
         </p:blipFill>
         <p:spPr>
           <a:xfrm>
-            <a:off x="600075" y="1869988"/>
-            <a:ext cx="3897012" cy="3464011"/>
+            <a:off x="122795" y="1779373"/>
+            <a:ext cx="4553820" cy="3039762"/>
           </a:xfrm>
           <a:prstGeom prst="rect">
             <a:avLst/>
@@ -11742,8 +11900,8 @@
         </p:blipFill>
         <p:spPr>
           <a:xfrm>
-            <a:off x="4679864" y="3720696"/>
-            <a:ext cx="4002817" cy="2848980"/>
+            <a:off x="4343785" y="3179142"/>
+            <a:ext cx="4475439" cy="3279986"/>
           </a:xfrm>
           <a:prstGeom prst="rect">
             <a:avLst/>
@@ -11753,7 +11911,7 @@
     </p:spTree>
     <p:extLst>
       <p:ext uri="{BB962C8B-B14F-4D97-AF65-F5344CB8AC3E}">
-        <p14:creationId xmlns:p14="http://schemas.microsoft.com/office/powerpoint/2010/main" val="1258239141"/>
+        <p14:creationId xmlns:p14="http://schemas.microsoft.com/office/powerpoint/2010/main" val="1282878099"/>
       </p:ext>
     </p:extLst>
   </p:cSld>
@@ -11934,7 +12092,7 @@
       </p:grpSpPr>
       <p:pic>
         <p:nvPicPr>
-          <p:cNvPr id="3" name="Imagen 2"/>
+          <p:cNvPr id="2" name="Imagen 1"/>
           <p:cNvPicPr>
             <a:picLocks noChangeAspect="1"/>
           </p:cNvPicPr>
@@ -11954,47 +12112,48 @@
         </p:blipFill>
         <p:spPr>
           <a:xfrm>
-            <a:off x="370703" y="2309286"/>
-            <a:ext cx="8295503" cy="3430582"/>
+            <a:off x="600075" y="1869988"/>
+            <a:ext cx="3897012" cy="3464011"/>
           </a:xfrm>
           <a:prstGeom prst="rect">
             <a:avLst/>
           </a:prstGeom>
         </p:spPr>
       </p:pic>
-      <p:sp>
-        <p:nvSpPr>
-          <p:cNvPr id="4" name="CuadroTexto 3"/>
-          <p:cNvSpPr txBox="1"/>
+      <p:pic>
+        <p:nvPicPr>
+          <p:cNvPr id="3" name="Imagen 2"/>
+          <p:cNvPicPr>
+            <a:picLocks noChangeAspect="1"/>
+          </p:cNvPicPr>
           <p:nvPr/>
-        </p:nvSpPr>
-        <p:spPr>
-          <a:xfrm>
-            <a:off x="2347784" y="436606"/>
-            <a:ext cx="4786184" cy="1005016"/>
-          </a:xfrm>
-          <a:prstGeom prst="rect">
-            <a:avLst/>
-          </a:prstGeom>
-        </p:spPr>
-        <p:txBody>
-          <a:bodyPr vert="horz" wrap="square" lIns="91440" tIns="45720" rIns="91440" bIns="45720" rtlCol="0" anchor="ctr">
-            <a:noAutofit/>
-          </a:bodyPr>
-          <a:lstStyle/>
-          <a:p>
-            <a:pPr algn="ctr"/>
-            <a:r>
-              <a:rPr lang="es-ES" sz="4000" b="1" dirty="0" smtClean="0"/>
-              <a:t>Diagrama de Distribución</a:t>
-            </a:r>
-          </a:p>
-        </p:txBody>
-      </p:sp>
+        </p:nvPicPr>
+        <p:blipFill>
+          <a:blip r:embed="rId3">
+            <a:extLst>
+              <a:ext uri="{28A0092B-C50C-407E-A947-70E740481C1C}">
+                <a14:useLocalDpi xmlns:a14="http://schemas.microsoft.com/office/drawing/2010/main" val="0"/>
+              </a:ext>
+            </a:extLst>
+          </a:blip>
+          <a:stretch>
+            <a:fillRect/>
+          </a:stretch>
+        </p:blipFill>
+        <p:spPr>
+          <a:xfrm>
+            <a:off x="4679864" y="3720696"/>
+            <a:ext cx="4002817" cy="2848980"/>
+          </a:xfrm>
+          <a:prstGeom prst="rect">
+            <a:avLst/>
+          </a:prstGeom>
+        </p:spPr>
+      </p:pic>
     </p:spTree>
     <p:extLst>
       <p:ext uri="{BB962C8B-B14F-4D97-AF65-F5344CB8AC3E}">
-        <p14:creationId xmlns:p14="http://schemas.microsoft.com/office/powerpoint/2010/main" val="709559944"/>
+        <p14:creationId xmlns:p14="http://schemas.microsoft.com/office/powerpoint/2010/main" val="1258239141"/>
       </p:ext>
     </p:extLst>
   </p:cSld>
@@ -12028,10 +12187,69 @@
           <a:chExt cx="0" cy="0"/>
         </a:xfrm>
       </p:grpSpPr>
+      <p:pic>
+        <p:nvPicPr>
+          <p:cNvPr id="3" name="Imagen 2"/>
+          <p:cNvPicPr>
+            <a:picLocks noChangeAspect="1"/>
+          </p:cNvPicPr>
+          <p:nvPr/>
+        </p:nvPicPr>
+        <p:blipFill>
+          <a:blip r:embed="rId2">
+            <a:extLst>
+              <a:ext uri="{28A0092B-C50C-407E-A947-70E740481C1C}">
+                <a14:useLocalDpi xmlns:a14="http://schemas.microsoft.com/office/drawing/2010/main" val="0"/>
+              </a:ext>
+            </a:extLst>
+          </a:blip>
+          <a:stretch>
+            <a:fillRect/>
+          </a:stretch>
+        </p:blipFill>
+        <p:spPr>
+          <a:xfrm>
+            <a:off x="370703" y="2309286"/>
+            <a:ext cx="8295503" cy="3430582"/>
+          </a:xfrm>
+          <a:prstGeom prst="rect">
+            <a:avLst/>
+          </a:prstGeom>
+        </p:spPr>
+      </p:pic>
+      <p:sp>
+        <p:nvSpPr>
+          <p:cNvPr id="4" name="CuadroTexto 3"/>
+          <p:cNvSpPr txBox="1"/>
+          <p:nvPr/>
+        </p:nvSpPr>
+        <p:spPr>
+          <a:xfrm>
+            <a:off x="2347784" y="436606"/>
+            <a:ext cx="4786184" cy="1005016"/>
+          </a:xfrm>
+          <a:prstGeom prst="rect">
+            <a:avLst/>
+          </a:prstGeom>
+        </p:spPr>
+        <p:txBody>
+          <a:bodyPr vert="horz" wrap="square" lIns="91440" tIns="45720" rIns="91440" bIns="45720" rtlCol="0" anchor="ctr">
+            <a:noAutofit/>
+          </a:bodyPr>
+          <a:lstStyle/>
+          <a:p>
+            <a:pPr algn="ctr"/>
+            <a:r>
+              <a:rPr lang="es-ES" sz="4000" b="1" dirty="0" smtClean="0"/>
+              <a:t>Diagrama de Distribución</a:t>
+            </a:r>
+          </a:p>
+        </p:txBody>
+      </p:sp>
     </p:spTree>
     <p:extLst>
       <p:ext uri="{BB962C8B-B14F-4D97-AF65-F5344CB8AC3E}">
-        <p14:creationId xmlns:p14="http://schemas.microsoft.com/office/powerpoint/2010/main" val="1065131570"/>
+        <p14:creationId xmlns:p14="http://schemas.microsoft.com/office/powerpoint/2010/main" val="709559944"/>
       </p:ext>
     </p:extLst>
   </p:cSld>
@@ -12067,7 +12285,7 @@
       </p:grpSpPr>
       <p:pic>
         <p:nvPicPr>
-          <p:cNvPr id="3" name="Imagen 2"/>
+          <p:cNvPr id="2" name="Imagen 1"/>
           <p:cNvPicPr>
             <a:picLocks noChangeAspect="1"/>
           </p:cNvPicPr>
@@ -12081,18 +12299,52 @@
         </p:blipFill>
         <p:spPr>
           <a:xfrm>
-            <a:off x="160092" y="1867437"/>
-            <a:ext cx="8893756" cy="3941338"/>
+            <a:off x="116748" y="2074136"/>
+            <a:ext cx="8977613" cy="4561795"/>
           </a:xfrm>
           <a:prstGeom prst="rect">
             <a:avLst/>
           </a:prstGeom>
         </p:spPr>
       </p:pic>
+      <p:sp>
+        <p:nvSpPr>
+          <p:cNvPr id="3" name="CuadroTexto 2"/>
+          <p:cNvSpPr txBox="1"/>
+          <p:nvPr/>
+        </p:nvSpPr>
+        <p:spPr>
+          <a:xfrm>
+            <a:off x="1566674" y="442138"/>
+            <a:ext cx="6077759" cy="1005016"/>
+          </a:xfrm>
+          <a:prstGeom prst="rect">
+            <a:avLst/>
+          </a:prstGeom>
+        </p:spPr>
+        <p:txBody>
+          <a:bodyPr vert="horz" wrap="square" lIns="91440" tIns="45720" rIns="91440" bIns="45720" rtlCol="0" anchor="ctr">
+            <a:noAutofit/>
+          </a:bodyPr>
+          <a:lstStyle/>
+          <a:p>
+            <a:pPr algn="ctr"/>
+            <a:r>
+              <a:rPr lang="es-ES" sz="4800" b="1" dirty="0" smtClean="0"/>
+              <a:t>Diagrama de </a:t>
+            </a:r>
+            <a:r>
+              <a:rPr lang="es-ES" sz="4800" b="1" dirty="0" smtClean="0"/>
+              <a:t>Componentes</a:t>
+            </a:r>
+            <a:endParaRPr lang="es-ES" sz="4800" b="1" dirty="0" smtClean="0"/>
+          </a:p>
+        </p:txBody>
+      </p:sp>
     </p:spTree>
     <p:extLst>
       <p:ext uri="{BB962C8B-B14F-4D97-AF65-F5344CB8AC3E}">
-        <p14:creationId xmlns:p14="http://schemas.microsoft.com/office/powerpoint/2010/main" val="3936201469"/>
+        <p14:creationId xmlns:p14="http://schemas.microsoft.com/office/powerpoint/2010/main" val="1065131570"/>
       </p:ext>
     </p:extLst>
   </p:cSld>
@@ -12126,121 +12378,40 @@
           <a:chExt cx="0" cy="0"/>
         </a:xfrm>
       </p:grpSpPr>
-      <p:sp>
-        <p:nvSpPr>
-          <p:cNvPr id="2" name="Rectángulo 1"/>
-          <p:cNvSpPr/>
+      <p:pic>
+        <p:nvPicPr>
+          <p:cNvPr id="3" name="Imagen 2"/>
+          <p:cNvPicPr>
+            <a:picLocks noChangeAspect="1"/>
+          </p:cNvPicPr>
           <p:nvPr/>
-        </p:nvSpPr>
-        <p:spPr>
-          <a:xfrm>
-            <a:off x="873025" y="2948120"/>
-            <a:ext cx="184731" cy="369332"/>
-          </a:xfrm>
-          <a:prstGeom prst="rect">
-            <a:avLst/>
-          </a:prstGeom>
-        </p:spPr>
-        <p:txBody>
-          <a:bodyPr wrap="none">
-            <a:spAutoFit/>
-          </a:bodyPr>
-          <a:lstStyle/>
-          <a:p>
-            <a:endParaRPr lang="es-CO" dirty="0"/>
-          </a:p>
-        </p:txBody>
-      </p:sp>
-      <p:sp>
-        <p:nvSpPr>
-          <p:cNvPr id="3" name="Esquina doblada 2">
-            <a:hlinkClick r:id="rId2" action="ppaction://hlinkfile"/>
-          </p:cNvPr>
-          <p:cNvSpPr/>
-          <p:nvPr/>
-        </p:nvSpPr>
-        <p:spPr>
-          <a:xfrm>
-            <a:off x="1687132" y="2385812"/>
-            <a:ext cx="2253803" cy="1880315"/>
-          </a:xfrm>
-          <a:prstGeom prst="foldedCorner">
-            <a:avLst/>
-          </a:prstGeom>
-        </p:spPr>
-        <p:style>
-          <a:lnRef idx="1">
-            <a:schemeClr val="accent1"/>
-          </a:lnRef>
-          <a:fillRef idx="3">
-            <a:schemeClr val="accent1"/>
-          </a:fillRef>
-          <a:effectRef idx="2">
-            <a:schemeClr val="accent1"/>
-          </a:effectRef>
-          <a:fontRef idx="minor">
-            <a:schemeClr val="lt1"/>
-          </a:fontRef>
-        </p:style>
-        <p:txBody>
-          <a:bodyPr rtlCol="0" anchor="ctr"/>
-          <a:lstStyle/>
-          <a:p>
-            <a:pPr algn="ctr"/>
-            <a:endParaRPr lang="es-CO"/>
-          </a:p>
-        </p:txBody>
-      </p:sp>
-      <p:sp>
-        <p:nvSpPr>
-          <p:cNvPr id="4" name="Esquina doblada 3">
-            <a:hlinkClick r:id="rId3" action="ppaction://hlinkfile"/>
-          </p:cNvPr>
-          <p:cNvSpPr/>
-          <p:nvPr/>
-        </p:nvSpPr>
-        <p:spPr>
-          <a:xfrm>
-            <a:off x="4932609" y="2385812"/>
-            <a:ext cx="2253802" cy="1748306"/>
-          </a:xfrm>
-          <a:prstGeom prst="foldedCorner">
-            <a:avLst/>
-          </a:prstGeom>
-        </p:spPr>
-        <p:style>
-          <a:lnRef idx="1">
-            <a:schemeClr val="accent1"/>
-          </a:lnRef>
-          <a:fillRef idx="3">
-            <a:schemeClr val="accent1"/>
-          </a:fillRef>
-          <a:effectRef idx="2">
-            <a:schemeClr val="accent1"/>
-          </a:effectRef>
-          <a:fontRef idx="minor">
-            <a:schemeClr val="lt1"/>
-          </a:fontRef>
-        </p:style>
-        <p:txBody>
-          <a:bodyPr rtlCol="0" anchor="ctr"/>
-          <a:lstStyle/>
-          <a:p>
-            <a:pPr algn="ctr"/>
-            <a:endParaRPr lang="es-CO"/>
-          </a:p>
-        </p:txBody>
-      </p:sp>
-      <p:sp>
-        <p:nvSpPr>
-          <p:cNvPr id="5" name="CuadroTexto 4"/>
+        </p:nvPicPr>
+        <p:blipFill>
+          <a:blip r:embed="rId2"/>
+          <a:stretch>
+            <a:fillRect/>
+          </a:stretch>
+        </p:blipFill>
+        <p:spPr>
+          <a:xfrm>
+            <a:off x="160092" y="1867437"/>
+            <a:ext cx="8893756" cy="3941338"/>
+          </a:xfrm>
+          <a:prstGeom prst="rect">
+            <a:avLst/>
+          </a:prstGeom>
+        </p:spPr>
+      </p:pic>
+      <p:sp>
+        <p:nvSpPr>
+          <p:cNvPr id="4" name="CuadroTexto 3"/>
           <p:cNvSpPr txBox="1"/>
           <p:nvPr/>
         </p:nvSpPr>
         <p:spPr>
           <a:xfrm>
-            <a:off x="2125014" y="2948120"/>
-            <a:ext cx="1300766" cy="593570"/>
+            <a:off x="1483182" y="323747"/>
+            <a:ext cx="6247576" cy="1005016"/>
           </a:xfrm>
           <a:prstGeom prst="rect">
             <a:avLst/>
@@ -12252,106 +12423,19 @@
           </a:bodyPr>
           <a:lstStyle/>
           <a:p>
-            <a:pPr algn="l"/>
-            <a:r>
-              <a:rPr lang="es-CO" sz="2000" b="1" dirty="0" smtClean="0"/>
-              <a:t>Manual de usuario</a:t>
-            </a:r>
-          </a:p>
-        </p:txBody>
-      </p:sp>
-      <p:sp>
-        <p:nvSpPr>
-          <p:cNvPr id="6" name="CuadroTexto 5"/>
-          <p:cNvSpPr txBox="1"/>
-          <p:nvPr/>
-        </p:nvSpPr>
-        <p:spPr>
-          <a:xfrm>
-            <a:off x="5692462" y="2948120"/>
-            <a:ext cx="1171977" cy="735238"/>
-          </a:xfrm>
-          <a:prstGeom prst="rect">
-            <a:avLst/>
-          </a:prstGeom>
-        </p:spPr>
-        <p:txBody>
-          <a:bodyPr vert="horz" wrap="square" lIns="91440" tIns="45720" rIns="91440" bIns="45720" rtlCol="0" anchor="ctr">
-            <a:noAutofit/>
-          </a:bodyPr>
-          <a:lstStyle/>
-          <a:p>
-            <a:pPr algn="l"/>
-            <a:endParaRPr lang="es-CO" sz="8000" b="1" dirty="0" smtClean="0">
-              <a:solidFill>
-                <a:srgbClr val="92D050"/>
-              </a:solidFill>
-            </a:endParaRPr>
-          </a:p>
-        </p:txBody>
-      </p:sp>
-      <p:sp>
-        <p:nvSpPr>
-          <p:cNvPr id="7" name="CuadroTexto 6"/>
-          <p:cNvSpPr txBox="1"/>
-          <p:nvPr/>
-        </p:nvSpPr>
-        <p:spPr>
-          <a:xfrm>
-            <a:off x="5267459" y="2807594"/>
-            <a:ext cx="1687133" cy="875764"/>
-          </a:xfrm>
-          <a:prstGeom prst="rect">
-            <a:avLst/>
-          </a:prstGeom>
-        </p:spPr>
-        <p:txBody>
-          <a:bodyPr vert="horz" wrap="square" lIns="91440" tIns="45720" rIns="91440" bIns="45720" rtlCol="0" anchor="ctr">
-            <a:noAutofit/>
-          </a:bodyPr>
-          <a:lstStyle/>
-          <a:p>
-            <a:pPr algn="l"/>
-            <a:r>
-              <a:rPr lang="es-CO" sz="2000" b="1" dirty="0" smtClean="0"/>
-              <a:t>Manual técnico</a:t>
-            </a:r>
-          </a:p>
-        </p:txBody>
-      </p:sp>
-      <p:sp>
-        <p:nvSpPr>
-          <p:cNvPr id="8" name="CuadroTexto 7"/>
-          <p:cNvSpPr txBox="1"/>
-          <p:nvPr/>
-        </p:nvSpPr>
-        <p:spPr>
-          <a:xfrm>
-            <a:off x="1893194" y="605307"/>
-            <a:ext cx="6001555" cy="888642"/>
-          </a:xfrm>
-          <a:prstGeom prst="rect">
-            <a:avLst/>
-          </a:prstGeom>
-        </p:spPr>
-        <p:txBody>
-          <a:bodyPr vert="horz" wrap="square" lIns="91440" tIns="45720" rIns="91440" bIns="45720" rtlCol="0" anchor="ctr">
-            <a:noAutofit/>
-          </a:bodyPr>
-          <a:lstStyle/>
-          <a:p>
             <a:pPr algn="ctr"/>
             <a:r>
-              <a:rPr lang="es-CO" sz="6000" b="1" dirty="0" smtClean="0"/>
-              <a:t>manuales</a:t>
-            </a:r>
+              <a:rPr lang="es-ES" sz="4800" b="1" dirty="0" smtClean="0"/>
+              <a:t>Cuadro comparativo</a:t>
+            </a:r>
+            <a:endParaRPr lang="es-ES" sz="4800" b="1" dirty="0" smtClean="0"/>
           </a:p>
         </p:txBody>
       </p:sp>
     </p:spTree>
     <p:extLst>
       <p:ext uri="{BB962C8B-B14F-4D97-AF65-F5344CB8AC3E}">
-        <p14:creationId xmlns:p14="http://schemas.microsoft.com/office/powerpoint/2010/main" val="987535"/>
+        <p14:creationId xmlns:p14="http://schemas.microsoft.com/office/powerpoint/2010/main" val="3936201469"/>
       </p:ext>
     </p:extLst>
   </p:cSld>
@@ -12393,76 +12477,216 @@
         </p:nvSpPr>
         <p:spPr>
           <a:xfrm>
-            <a:off x="1033847" y="1409347"/>
-            <a:ext cx="7788877" cy="5262979"/>
+            <a:off x="873025" y="2948120"/>
+            <a:ext cx="184731" cy="369332"/>
           </a:xfrm>
           <a:prstGeom prst="rect">
             <a:avLst/>
           </a:prstGeom>
         </p:spPr>
         <p:txBody>
-          <a:bodyPr wrap="square">
+          <a:bodyPr wrap="none">
             <a:spAutoFit/>
           </a:bodyPr>
           <a:lstStyle/>
           <a:p>
-            <a:r>
-              <a:rPr lang="es-ES" sz="2800" dirty="0"/>
-              <a:t>Pruebas: Utilizando una técnica que se acople</a:t>
-            </a:r>
-          </a:p>
-          <a:p>
-            <a:r>
-              <a:rPr lang="es-ES" sz="2800" dirty="0"/>
-              <a:t>	a la herramienta tecnológica según el lenguaje de</a:t>
-            </a:r>
-          </a:p>
-          <a:p>
-            <a:r>
-              <a:rPr lang="es-ES" sz="2800" dirty="0"/>
-              <a:t>	programación utilizado</a:t>
-            </a:r>
-          </a:p>
-          <a:p>
-            <a:endParaRPr lang="es-ES" sz="2800" dirty="0"/>
-          </a:p>
-          <a:p>
-            <a:r>
-              <a:rPr lang="es-ES" sz="2800" b="1" dirty="0"/>
-              <a:t>	Técnicas:</a:t>
-            </a:r>
-          </a:p>
-          <a:p>
-            <a:r>
-              <a:rPr lang="es-ES" sz="2800" dirty="0"/>
-              <a:t>	-Pruebas unitarias -Pruebas de humo</a:t>
-            </a:r>
-          </a:p>
-          <a:p>
-            <a:endParaRPr lang="es-ES" sz="2800" dirty="0"/>
-          </a:p>
-          <a:p>
-            <a:r>
-              <a:rPr lang="es-ES" sz="2800" dirty="0"/>
-              <a:t>	-Pruebas caja negra -Pruebas regresión</a:t>
-            </a:r>
-          </a:p>
-          <a:p>
-            <a:endParaRPr lang="es-ES" sz="2800" dirty="0"/>
-          </a:p>
-          <a:p>
-            <a:r>
-              <a:rPr lang="es-ES" sz="2800" dirty="0"/>
-              <a:t>	-Pruebas caja blanca -Pruebas del sistema</a:t>
-            </a:r>
-          </a:p>
-          <a:p>
-            <a:endParaRPr lang="es-ES" sz="2800" dirty="0"/>
-          </a:p>
-          <a:p>
-            <a:r>
-              <a:rPr lang="es-ES" sz="2800" dirty="0"/>
-              <a:t>	-Pruebas funcionales -Pruebas de stress</a:t>
+            <a:endParaRPr lang="es-CO" dirty="0"/>
+          </a:p>
+        </p:txBody>
+      </p:sp>
+      <p:sp>
+        <p:nvSpPr>
+          <p:cNvPr id="3" name="Esquina doblada 2">
+            <a:hlinkClick r:id="rId2" action="ppaction://hlinkfile"/>
+          </p:cNvPr>
+          <p:cNvSpPr/>
+          <p:nvPr/>
+        </p:nvSpPr>
+        <p:spPr>
+          <a:xfrm>
+            <a:off x="1687132" y="2385812"/>
+            <a:ext cx="2253803" cy="1880315"/>
+          </a:xfrm>
+          <a:prstGeom prst="foldedCorner">
+            <a:avLst/>
+          </a:prstGeom>
+        </p:spPr>
+        <p:style>
+          <a:lnRef idx="1">
+            <a:schemeClr val="accent1"/>
+          </a:lnRef>
+          <a:fillRef idx="3">
+            <a:schemeClr val="accent1"/>
+          </a:fillRef>
+          <a:effectRef idx="2">
+            <a:schemeClr val="accent1"/>
+          </a:effectRef>
+          <a:fontRef idx="minor">
+            <a:schemeClr val="lt1"/>
+          </a:fontRef>
+        </p:style>
+        <p:txBody>
+          <a:bodyPr rtlCol="0" anchor="ctr"/>
+          <a:lstStyle/>
+          <a:p>
+            <a:pPr algn="ctr"/>
+            <a:endParaRPr lang="es-CO"/>
+          </a:p>
+        </p:txBody>
+      </p:sp>
+      <p:sp>
+        <p:nvSpPr>
+          <p:cNvPr id="4" name="Esquina doblada 3">
+            <a:hlinkClick r:id="rId3" action="ppaction://hlinkfile"/>
+          </p:cNvPr>
+          <p:cNvSpPr/>
+          <p:nvPr/>
+        </p:nvSpPr>
+        <p:spPr>
+          <a:xfrm>
+            <a:off x="4932609" y="2385812"/>
+            <a:ext cx="2253802" cy="1748306"/>
+          </a:xfrm>
+          <a:prstGeom prst="foldedCorner">
+            <a:avLst/>
+          </a:prstGeom>
+        </p:spPr>
+        <p:style>
+          <a:lnRef idx="1">
+            <a:schemeClr val="accent1"/>
+          </a:lnRef>
+          <a:fillRef idx="3">
+            <a:schemeClr val="accent1"/>
+          </a:fillRef>
+          <a:effectRef idx="2">
+            <a:schemeClr val="accent1"/>
+          </a:effectRef>
+          <a:fontRef idx="minor">
+            <a:schemeClr val="lt1"/>
+          </a:fontRef>
+        </p:style>
+        <p:txBody>
+          <a:bodyPr rtlCol="0" anchor="ctr"/>
+          <a:lstStyle/>
+          <a:p>
+            <a:pPr algn="ctr"/>
+            <a:endParaRPr lang="es-CO"/>
+          </a:p>
+        </p:txBody>
+      </p:sp>
+      <p:sp>
+        <p:nvSpPr>
+          <p:cNvPr id="5" name="CuadroTexto 4"/>
+          <p:cNvSpPr txBox="1"/>
+          <p:nvPr/>
+        </p:nvSpPr>
+        <p:spPr>
+          <a:xfrm>
+            <a:off x="2125014" y="2948120"/>
+            <a:ext cx="1300766" cy="593570"/>
+          </a:xfrm>
+          <a:prstGeom prst="rect">
+            <a:avLst/>
+          </a:prstGeom>
+        </p:spPr>
+        <p:txBody>
+          <a:bodyPr vert="horz" wrap="square" lIns="91440" tIns="45720" rIns="91440" bIns="45720" rtlCol="0" anchor="ctr">
+            <a:noAutofit/>
+          </a:bodyPr>
+          <a:lstStyle/>
+          <a:p>
+            <a:pPr algn="l"/>
+            <a:r>
+              <a:rPr lang="es-CO" sz="2000" b="1" dirty="0" smtClean="0"/>
+              <a:t>Manual de usuario</a:t>
+            </a:r>
+          </a:p>
+        </p:txBody>
+      </p:sp>
+      <p:sp>
+        <p:nvSpPr>
+          <p:cNvPr id="6" name="CuadroTexto 5"/>
+          <p:cNvSpPr txBox="1"/>
+          <p:nvPr/>
+        </p:nvSpPr>
+        <p:spPr>
+          <a:xfrm>
+            <a:off x="5692462" y="2948120"/>
+            <a:ext cx="1171977" cy="735238"/>
+          </a:xfrm>
+          <a:prstGeom prst="rect">
+            <a:avLst/>
+          </a:prstGeom>
+        </p:spPr>
+        <p:txBody>
+          <a:bodyPr vert="horz" wrap="square" lIns="91440" tIns="45720" rIns="91440" bIns="45720" rtlCol="0" anchor="ctr">
+            <a:noAutofit/>
+          </a:bodyPr>
+          <a:lstStyle/>
+          <a:p>
+            <a:pPr algn="l"/>
+            <a:endParaRPr lang="es-CO" sz="8000" b="1" dirty="0" smtClean="0">
+              <a:solidFill>
+                <a:srgbClr val="92D050"/>
+              </a:solidFill>
+            </a:endParaRPr>
+          </a:p>
+        </p:txBody>
+      </p:sp>
+      <p:sp>
+        <p:nvSpPr>
+          <p:cNvPr id="7" name="CuadroTexto 6"/>
+          <p:cNvSpPr txBox="1"/>
+          <p:nvPr/>
+        </p:nvSpPr>
+        <p:spPr>
+          <a:xfrm>
+            <a:off x="5267459" y="2807594"/>
+            <a:ext cx="1687133" cy="875764"/>
+          </a:xfrm>
+          <a:prstGeom prst="rect">
+            <a:avLst/>
+          </a:prstGeom>
+        </p:spPr>
+        <p:txBody>
+          <a:bodyPr vert="horz" wrap="square" lIns="91440" tIns="45720" rIns="91440" bIns="45720" rtlCol="0" anchor="ctr">
+            <a:noAutofit/>
+          </a:bodyPr>
+          <a:lstStyle/>
+          <a:p>
+            <a:pPr algn="l"/>
+            <a:r>
+              <a:rPr lang="es-CO" sz="2000" b="1" dirty="0" smtClean="0"/>
+              <a:t>Manual técnico</a:t>
+            </a:r>
+          </a:p>
+        </p:txBody>
+      </p:sp>
+      <p:sp>
+        <p:nvSpPr>
+          <p:cNvPr id="8" name="CuadroTexto 7"/>
+          <p:cNvSpPr txBox="1"/>
+          <p:nvPr/>
+        </p:nvSpPr>
+        <p:spPr>
+          <a:xfrm>
+            <a:off x="1893194" y="605307"/>
+            <a:ext cx="6001555" cy="888642"/>
+          </a:xfrm>
+          <a:prstGeom prst="rect">
+            <a:avLst/>
+          </a:prstGeom>
+        </p:spPr>
+        <p:txBody>
+          <a:bodyPr vert="horz" wrap="square" lIns="91440" tIns="45720" rIns="91440" bIns="45720" rtlCol="0" anchor="ctr">
+            <a:noAutofit/>
+          </a:bodyPr>
+          <a:lstStyle/>
+          <a:p>
+            <a:pPr algn="ctr"/>
+            <a:r>
+              <a:rPr lang="es-CO" sz="6000" b="1" dirty="0" smtClean="0"/>
+              <a:t>manuales</a:t>
             </a:r>
           </a:p>
         </p:txBody>
@@ -12470,7 +12694,7 @@
     </p:spTree>
     <p:extLst>
       <p:ext uri="{BB962C8B-B14F-4D97-AF65-F5344CB8AC3E}">
-        <p14:creationId xmlns:p14="http://schemas.microsoft.com/office/powerpoint/2010/main" val="3289031835"/>
+        <p14:creationId xmlns:p14="http://schemas.microsoft.com/office/powerpoint/2010/main" val="987535"/>
       </p:ext>
     </p:extLst>
   </p:cSld>
@@ -12506,6 +12730,125 @@
       </p:grpSpPr>
       <p:sp>
         <p:nvSpPr>
+          <p:cNvPr id="2" name="Rectángulo 1"/>
+          <p:cNvSpPr/>
+          <p:nvPr/>
+        </p:nvSpPr>
+        <p:spPr>
+          <a:xfrm>
+            <a:off x="1033847" y="1409347"/>
+            <a:ext cx="7788877" cy="5262979"/>
+          </a:xfrm>
+          <a:prstGeom prst="rect">
+            <a:avLst/>
+          </a:prstGeom>
+        </p:spPr>
+        <p:txBody>
+          <a:bodyPr wrap="square">
+            <a:spAutoFit/>
+          </a:bodyPr>
+          <a:lstStyle/>
+          <a:p>
+            <a:r>
+              <a:rPr lang="es-ES" sz="2800" dirty="0"/>
+              <a:t>Pruebas: Utilizando una técnica que se acople</a:t>
+            </a:r>
+          </a:p>
+          <a:p>
+            <a:r>
+              <a:rPr lang="es-ES" sz="2800" dirty="0"/>
+              <a:t>	a la herramienta tecnológica según el lenguaje de</a:t>
+            </a:r>
+          </a:p>
+          <a:p>
+            <a:r>
+              <a:rPr lang="es-ES" sz="2800" dirty="0"/>
+              <a:t>	programación utilizado</a:t>
+            </a:r>
+          </a:p>
+          <a:p>
+            <a:endParaRPr lang="es-ES" sz="2800" dirty="0"/>
+          </a:p>
+          <a:p>
+            <a:r>
+              <a:rPr lang="es-ES" sz="2800" b="1" dirty="0"/>
+              <a:t>	Técnicas:</a:t>
+            </a:r>
+          </a:p>
+          <a:p>
+            <a:r>
+              <a:rPr lang="es-ES" sz="2800" dirty="0"/>
+              <a:t>	-Pruebas unitarias -Pruebas de humo</a:t>
+            </a:r>
+          </a:p>
+          <a:p>
+            <a:endParaRPr lang="es-ES" sz="2800" dirty="0"/>
+          </a:p>
+          <a:p>
+            <a:r>
+              <a:rPr lang="es-ES" sz="2800" dirty="0"/>
+              <a:t>	-Pruebas caja negra -Pruebas regresión</a:t>
+            </a:r>
+          </a:p>
+          <a:p>
+            <a:endParaRPr lang="es-ES" sz="2800" dirty="0"/>
+          </a:p>
+          <a:p>
+            <a:r>
+              <a:rPr lang="es-ES" sz="2800" dirty="0"/>
+              <a:t>	-Pruebas caja blanca -Pruebas del sistema</a:t>
+            </a:r>
+          </a:p>
+          <a:p>
+            <a:endParaRPr lang="es-ES" sz="2800" dirty="0"/>
+          </a:p>
+          <a:p>
+            <a:r>
+              <a:rPr lang="es-ES" sz="2800" dirty="0"/>
+              <a:t>	-Pruebas funcionales -Pruebas de stress</a:t>
+            </a:r>
+          </a:p>
+        </p:txBody>
+      </p:sp>
+    </p:spTree>
+    <p:extLst>
+      <p:ext uri="{BB962C8B-B14F-4D97-AF65-F5344CB8AC3E}">
+        <p14:creationId xmlns:p14="http://schemas.microsoft.com/office/powerpoint/2010/main" val="3289031835"/>
+      </p:ext>
+    </p:extLst>
+  </p:cSld>
+  <p:clrMapOvr>
+    <a:masterClrMapping/>
+  </p:clrMapOvr>
+  <p:timing>
+    <p:tnLst>
+      <p:par>
+        <p:cTn id="1" dur="indefinite" restart="never" nodeType="tmRoot"/>
+      </p:par>
+    </p:tnLst>
+  </p:timing>
+</p:sld>
+</file>
+
+<file path=ppt/slides/slide46.xml><?xml version="1.0" encoding="utf-8"?>
+<p:sld xmlns:a="http://schemas.openxmlformats.org/drawingml/2006/main" xmlns:r="http://schemas.openxmlformats.org/officeDocument/2006/relationships" xmlns:p="http://schemas.openxmlformats.org/presentationml/2006/main">
+  <p:cSld>
+    <p:spTree>
+      <p:nvGrpSpPr>
+        <p:cNvPr id="1" name=""/>
+        <p:cNvGrpSpPr/>
+        <p:nvPr/>
+      </p:nvGrpSpPr>
+      <p:grpSpPr>
+        <a:xfrm>
+          <a:off x="0" y="0"/>
+          <a:ext cx="0" cy="0"/>
+          <a:chOff x="0" y="0"/>
+          <a:chExt cx="0" cy="0"/>
+        </a:xfrm>
+      </p:grpSpPr>
+      <p:sp>
+        <p:nvSpPr>
           <p:cNvPr id="2" name="CuadroTexto 1"/>
           <p:cNvSpPr txBox="1"/>
           <p:nvPr/>
@@ -12681,7 +13024,7 @@
 </p:sld>
 </file>
 
-<file path=ppt/slides/slide46.xml><?xml version="1.0" encoding="utf-8"?>
+<file path=ppt/slides/slide47.xml><?xml version="1.0" encoding="utf-8"?>
 <p:sld xmlns:a="http://schemas.openxmlformats.org/drawingml/2006/main" xmlns:r="http://schemas.openxmlformats.org/officeDocument/2006/relationships" xmlns:p="http://schemas.openxmlformats.org/presentationml/2006/main">
   <p:cSld>
     <p:spTree>
@@ -12806,79 +13149,6 @@
 </p:sld>
 </file>
 
-<file path=ppt/slides/slide47.xml><?xml version="1.0" encoding="utf-8"?>
-<p:sld xmlns:a="http://schemas.openxmlformats.org/drawingml/2006/main" xmlns:r="http://schemas.openxmlformats.org/officeDocument/2006/relationships" xmlns:p="http://schemas.openxmlformats.org/presentationml/2006/main">
-  <p:cSld>
-    <p:spTree>
-      <p:nvGrpSpPr>
-        <p:cNvPr id="1" name=""/>
-        <p:cNvGrpSpPr/>
-        <p:nvPr/>
-      </p:nvGrpSpPr>
-      <p:grpSpPr>
-        <a:xfrm>
-          <a:off x="0" y="0"/>
-          <a:ext cx="0" cy="0"/>
-          <a:chOff x="0" y="0"/>
-          <a:chExt cx="0" cy="0"/>
-        </a:xfrm>
-      </p:grpSpPr>
-      <p:sp>
-        <p:nvSpPr>
-          <p:cNvPr id="2" name="Rectángulo 1"/>
-          <p:cNvSpPr/>
-          <p:nvPr/>
-        </p:nvSpPr>
-        <p:spPr>
-          <a:xfrm>
-            <a:off x="2103108" y="3351426"/>
-            <a:ext cx="5291833" cy="584775"/>
-          </a:xfrm>
-          <a:prstGeom prst="rect">
-            <a:avLst/>
-          </a:prstGeom>
-        </p:spPr>
-        <p:txBody>
-          <a:bodyPr wrap="none">
-            <a:spAutoFit/>
-          </a:bodyPr>
-          <a:lstStyle/>
-          <a:p>
-            <a:r>
-              <a:rPr lang="es-ES" sz="3200" dirty="0"/>
-              <a:t>Informe de </a:t>
-            </a:r>
-            <a:r>
-              <a:rPr lang="es-ES" sz="3200" dirty="0" smtClean="0"/>
-              <a:t>migración </a:t>
-            </a:r>
-            <a:r>
-              <a:rPr lang="es-ES" sz="3200" dirty="0"/>
-              <a:t>de datos</a:t>
-            </a:r>
-          </a:p>
-        </p:txBody>
-      </p:sp>
-    </p:spTree>
-    <p:extLst>
-      <p:ext uri="{BB962C8B-B14F-4D97-AF65-F5344CB8AC3E}">
-        <p14:creationId xmlns:p14="http://schemas.microsoft.com/office/powerpoint/2010/main" val="1744938184"/>
-      </p:ext>
-    </p:extLst>
-  </p:cSld>
-  <p:clrMapOvr>
-    <a:masterClrMapping/>
-  </p:clrMapOvr>
-  <p:timing>
-    <p:tnLst>
-      <p:par>
-        <p:cTn id="1" dur="indefinite" restart="never" nodeType="tmRoot"/>
-      </p:par>
-    </p:tnLst>
-  </p:timing>
-</p:sld>
-</file>
-
 <file path=ppt/slides/slide48.xml><?xml version="1.0" encoding="utf-8"?>
 <p:sld xmlns:a="http://schemas.openxmlformats.org/drawingml/2006/main" xmlns:r="http://schemas.openxmlformats.org/officeDocument/2006/relationships" xmlns:p="http://schemas.openxmlformats.org/presentationml/2006/main">
   <p:cSld>
@@ -12904,8 +13174,8 @@
         </p:nvSpPr>
         <p:spPr>
           <a:xfrm>
-            <a:off x="2657331" y="3183924"/>
-            <a:ext cx="4368312" cy="646331"/>
+            <a:off x="2103108" y="3351426"/>
+            <a:ext cx="5291833" cy="584775"/>
           </a:xfrm>
           <a:prstGeom prst="rect">
             <a:avLst/>
@@ -12918,8 +13188,16 @@
           <a:lstStyle/>
           <a:p>
             <a:r>
-              <a:rPr lang="es-ES" sz="3600" dirty="0"/>
-              <a:t>Contratos de Software</a:t>
+              <a:rPr lang="es-ES" sz="3200" dirty="0"/>
+              <a:t>Informe de </a:t>
+            </a:r>
+            <a:r>
+              <a:rPr lang="es-ES" sz="3200" dirty="0" smtClean="0"/>
+              <a:t>migración </a:t>
+            </a:r>
+            <a:r>
+              <a:rPr lang="es-ES" sz="3200" dirty="0"/>
+              <a:t>de datos</a:t>
             </a:r>
           </a:p>
         </p:txBody>
@@ -12927,7 +13205,7 @@
     </p:spTree>
     <p:extLst>
       <p:ext uri="{BB962C8B-B14F-4D97-AF65-F5344CB8AC3E}">
-        <p14:creationId xmlns:p14="http://schemas.microsoft.com/office/powerpoint/2010/main" val="1238283045"/>
+        <p14:creationId xmlns:p14="http://schemas.microsoft.com/office/powerpoint/2010/main" val="1744938184"/>
       </p:ext>
     </p:extLst>
   </p:cSld>
@@ -12963,74 +13241,28 @@
       </p:grpSpPr>
       <p:sp>
         <p:nvSpPr>
-          <p:cNvPr id="3" name="Rectángulo 2"/>
+          <p:cNvPr id="2" name="Rectángulo 1"/>
           <p:cNvSpPr/>
           <p:nvPr/>
         </p:nvSpPr>
         <p:spPr>
           <a:xfrm>
-            <a:off x="1750541" y="2136339"/>
-            <a:ext cx="6339016" cy="3970318"/>
+            <a:off x="2657331" y="3183924"/>
+            <a:ext cx="4368312" cy="646331"/>
           </a:xfrm>
           <a:prstGeom prst="rect">
             <a:avLst/>
           </a:prstGeom>
         </p:spPr>
         <p:txBody>
-          <a:bodyPr wrap="square">
+          <a:bodyPr wrap="none">
             <a:spAutoFit/>
           </a:bodyPr>
           <a:lstStyle/>
           <a:p>
             <a:r>
-              <a:rPr lang="es-ES" sz="2800" dirty="0"/>
-              <a:t>Documentación de las pruebas</a:t>
-            </a:r>
-          </a:p>
-          <a:p>
-            <a:r>
-              <a:rPr lang="es-ES" sz="2800" dirty="0"/>
-              <a:t>	</a:t>
-            </a:r>
-            <a:r>
-              <a:rPr lang="es-ES" sz="2800" b="1" dirty="0"/>
-              <a:t>a. </a:t>
-            </a:r>
-            <a:r>
-              <a:rPr lang="es-ES" sz="2800" dirty="0"/>
-              <a:t>Plan de capacitación para la implementación del nuevo</a:t>
-            </a:r>
-          </a:p>
-          <a:p>
-            <a:r>
-              <a:rPr lang="es-ES" sz="2800" dirty="0"/>
-              <a:t>	sistema de información</a:t>
-            </a:r>
-          </a:p>
-          <a:p>
-            <a:r>
-              <a:rPr lang="es-ES" sz="2800" dirty="0"/>
-              <a:t>	</a:t>
-            </a:r>
-            <a:r>
-              <a:rPr lang="es-ES" sz="2800" b="1" dirty="0"/>
-              <a:t>b. </a:t>
-            </a:r>
-            <a:r>
-              <a:rPr lang="es-ES" sz="2800" dirty="0"/>
-              <a:t>Distribución física de los equipos de hardware y el</a:t>
-            </a:r>
-          </a:p>
-          <a:p>
-            <a:r>
-              <a:rPr lang="es-ES" sz="2800" dirty="0"/>
-              <a:t>	software necesario para implementar el sistema de</a:t>
-            </a:r>
-          </a:p>
-          <a:p>
-            <a:r>
-              <a:rPr lang="es-ES" sz="2800" dirty="0"/>
-              <a:t>	información.</a:t>
+              <a:rPr lang="es-ES" sz="3600" dirty="0"/>
+              <a:t>Contratos de Software</a:t>
             </a:r>
           </a:p>
         </p:txBody>
@@ -13038,7 +13270,7 @@
     </p:spTree>
     <p:extLst>
       <p:ext uri="{BB962C8B-B14F-4D97-AF65-F5344CB8AC3E}">
-        <p14:creationId xmlns:p14="http://schemas.microsoft.com/office/powerpoint/2010/main" val="4240366308"/>
+        <p14:creationId xmlns:p14="http://schemas.microsoft.com/office/powerpoint/2010/main" val="1238283045"/>
       </p:ext>
     </p:extLst>
   </p:cSld>
@@ -13213,14 +13445,14 @@
       </p:grpSpPr>
       <p:sp>
         <p:nvSpPr>
-          <p:cNvPr id="2" name="Rectángulo 1"/>
+          <p:cNvPr id="3" name="Rectángulo 2"/>
           <p:cNvSpPr/>
           <p:nvPr/>
         </p:nvSpPr>
         <p:spPr>
           <a:xfrm>
-            <a:off x="2286000" y="2967335"/>
-            <a:ext cx="5515232" cy="2554545"/>
+            <a:off x="1750541" y="2136339"/>
+            <a:ext cx="6339016" cy="3970318"/>
           </a:xfrm>
           <a:prstGeom prst="rect">
             <a:avLst/>
@@ -13233,20 +13465,54 @@
           <a:lstStyle/>
           <a:p>
             <a:r>
-              <a:rPr lang="es-ES" sz="3200" dirty="0"/>
-              <a:t>Cuadro comparativo de los diferente</a:t>
-            </a:r>
-          </a:p>
-          <a:p>
-            <a:r>
-              <a:rPr lang="es-ES" sz="3200" dirty="0"/>
-              <a:t>proveedores donde se obtendrá el hardware y</a:t>
-            </a:r>
-          </a:p>
-          <a:p>
-            <a:r>
-              <a:rPr lang="es-ES" sz="3200" dirty="0"/>
-              <a:t>software</a:t>
+              <a:rPr lang="es-ES" sz="2800" dirty="0"/>
+              <a:t>Documentación de las pruebas</a:t>
+            </a:r>
+          </a:p>
+          <a:p>
+            <a:r>
+              <a:rPr lang="es-ES" sz="2800" dirty="0"/>
+              <a:t>	</a:t>
+            </a:r>
+            <a:r>
+              <a:rPr lang="es-ES" sz="2800" b="1" dirty="0"/>
+              <a:t>a. </a:t>
+            </a:r>
+            <a:r>
+              <a:rPr lang="es-ES" sz="2800" dirty="0"/>
+              <a:t>Plan de capacitación para la implementación del nuevo</a:t>
+            </a:r>
+          </a:p>
+          <a:p>
+            <a:r>
+              <a:rPr lang="es-ES" sz="2800" dirty="0"/>
+              <a:t>	sistema de información</a:t>
+            </a:r>
+          </a:p>
+          <a:p>
+            <a:r>
+              <a:rPr lang="es-ES" sz="2800" dirty="0"/>
+              <a:t>	</a:t>
+            </a:r>
+            <a:r>
+              <a:rPr lang="es-ES" sz="2800" b="1" dirty="0"/>
+              <a:t>b. </a:t>
+            </a:r>
+            <a:r>
+              <a:rPr lang="es-ES" sz="2800" dirty="0"/>
+              <a:t>Distribución física de los equipos de hardware y el</a:t>
+            </a:r>
+          </a:p>
+          <a:p>
+            <a:r>
+              <a:rPr lang="es-ES" sz="2800" dirty="0"/>
+              <a:t>	software necesario para implementar el sistema de</a:t>
+            </a:r>
+          </a:p>
+          <a:p>
+            <a:r>
+              <a:rPr lang="es-ES" sz="2800" dirty="0"/>
+              <a:t>	información.</a:t>
             </a:r>
           </a:p>
         </p:txBody>
@@ -13254,7 +13520,7 @@
     </p:spTree>
     <p:extLst>
       <p:ext uri="{BB962C8B-B14F-4D97-AF65-F5344CB8AC3E}">
-        <p14:creationId xmlns:p14="http://schemas.microsoft.com/office/powerpoint/2010/main" val="427644843"/>
+        <p14:creationId xmlns:p14="http://schemas.microsoft.com/office/powerpoint/2010/main" val="4240366308"/>
       </p:ext>
     </p:extLst>
   </p:cSld>

</xml_diff>

<commit_message>
se agrega contrato de sofware y diagrama de casos de uso
faltante 
- Pruebas caja negra
- migracion de datos
</commit_message>
<xml_diff>
--- a/Sexto Trimestre/PresentacionV6 terminar- 1012.pptx
+++ b/Sexto Trimestre/PresentacionV6 terminar- 1012.pptx
@@ -5,10 +5,10 @@
     <p:sldMasterId id="2147483648" r:id="rId1"/>
   </p:sldMasterIdLst>
   <p:notesMasterIdLst>
-    <p:notesMasterId r:id="rId54"/>
+    <p:notesMasterId r:id="rId53"/>
   </p:notesMasterIdLst>
   <p:handoutMasterIdLst>
-    <p:handoutMasterId r:id="rId55"/>
+    <p:handoutMasterId r:id="rId54"/>
   </p:handoutMasterIdLst>
   <p:sldIdLst>
     <p:sldId id="323" r:id="rId2"/>
@@ -62,7 +62,6 @@
     <p:sldId id="365" r:id="rId50"/>
     <p:sldId id="366" r:id="rId51"/>
     <p:sldId id="370" r:id="rId52"/>
-    <p:sldId id="371" r:id="rId53"/>
   </p:sldIdLst>
   <p:sldSz cx="9144000" cy="6858000" type="screen4x3"/>
   <p:notesSz cx="6858000" cy="9144000"/>
@@ -284,7 +283,7 @@
           <a:p>
             <a:fld id="{4E4206E0-8F38-491F-8DD8-9DEF31DAB11E}" type="datetimeFigureOut">
               <a:rPr lang="es-CO" smtClean="0"/>
-              <a:t>03/08/2017</a:t>
+              <a:t>09/08/2017</a:t>
             </a:fld>
             <a:endParaRPr lang="es-CO"/>
           </a:p>
@@ -449,7 +448,7 @@
           <a:p>
             <a:fld id="{AE7E15B5-955E-4B5B-9E1F-B3C4B4C6AE0C}" type="datetimeFigureOut">
               <a:rPr lang="es-CO" smtClean="0"/>
-              <a:t>03/08/2017</a:t>
+              <a:t>09/08/2017</a:t>
             </a:fld>
             <a:endParaRPr lang="es-CO"/>
           </a:p>
@@ -1213,7 +1212,7 @@
           <a:p>
             <a:fld id="{483D03DC-5ED8-7A42-A55E-C10C004AFC42}" type="datetimeFigureOut">
               <a:rPr lang="es-ES" smtClean="0"/>
-              <a:t>03/08/2017</a:t>
+              <a:t>09/08/2017</a:t>
             </a:fld>
             <a:endParaRPr lang="es-ES"/>
           </a:p>
@@ -1882,7 +1881,7 @@
           <a:p>
             <a:fld id="{483D03DC-5ED8-7A42-A55E-C10C004AFC42}" type="datetimeFigureOut">
               <a:rPr lang="es-ES" smtClean="0"/>
-              <a:t>03/08/2017</a:t>
+              <a:t>09/08/2017</a:t>
             </a:fld>
             <a:endParaRPr lang="es-ES" dirty="0"/>
           </a:p>
@@ -2041,7 +2040,7 @@
           <a:p>
             <a:fld id="{483D03DC-5ED8-7A42-A55E-C10C004AFC42}" type="datetimeFigureOut">
               <a:rPr lang="es-ES" smtClean="0"/>
-              <a:t>03/08/2017</a:t>
+              <a:t>09/08/2017</a:t>
             </a:fld>
             <a:endParaRPr lang="es-ES"/>
           </a:p>
@@ -2571,7 +2570,7 @@
           <a:p>
             <a:fld id="{483D03DC-5ED8-7A42-A55E-C10C004AFC42}" type="datetimeFigureOut">
               <a:rPr lang="es-ES" smtClean="0"/>
-              <a:t>03/08/2017</a:t>
+              <a:t>09/08/2017</a:t>
             </a:fld>
             <a:endParaRPr lang="es-ES"/>
           </a:p>
@@ -3104,7 +3103,7 @@
           <a:p>
             <a:fld id="{483D03DC-5ED8-7A42-A55E-C10C004AFC42}" type="datetimeFigureOut">
               <a:rPr lang="es-ES" smtClean="0"/>
-              <a:t>03/08/2017</a:t>
+              <a:t>09/08/2017</a:t>
             </a:fld>
             <a:endParaRPr lang="es-ES"/>
           </a:p>
@@ -3334,7 +3333,7 @@
           <a:p>
             <a:fld id="{483D03DC-5ED8-7A42-A55E-C10C004AFC42}" type="datetimeFigureOut">
               <a:rPr lang="es-ES" smtClean="0"/>
-              <a:t>03/08/2017</a:t>
+              <a:t>09/08/2017</a:t>
             </a:fld>
             <a:endParaRPr lang="es-ES"/>
           </a:p>
@@ -4012,7 +4011,7 @@
           <a:p>
             <a:fld id="{483D03DC-5ED8-7A42-A55E-C10C004AFC42}" type="datetimeFigureOut">
               <a:rPr lang="es-ES" smtClean="0"/>
-              <a:t>03/08/2017</a:t>
+              <a:t>09/08/2017</a:t>
             </a:fld>
             <a:endParaRPr lang="es-ES" dirty="0"/>
           </a:p>
@@ -4107,7 +4106,7 @@
           <a:p>
             <a:fld id="{483D03DC-5ED8-7A42-A55E-C10C004AFC42}" type="datetimeFigureOut">
               <a:rPr lang="es-ES" smtClean="0"/>
-              <a:t>03/08/2017</a:t>
+              <a:t>09/08/2017</a:t>
             </a:fld>
             <a:endParaRPr lang="es-ES"/>
           </a:p>
@@ -4652,7 +4651,7 @@
           <a:p>
             <a:fld id="{483D03DC-5ED8-7A42-A55E-C10C004AFC42}" type="datetimeFigureOut">
               <a:rPr lang="es-ES" smtClean="0"/>
-              <a:t>03/08/2017</a:t>
+              <a:t>09/08/2017</a:t>
             </a:fld>
             <a:endParaRPr lang="es-ES"/>
           </a:p>
@@ -5569,7 +5568,7 @@
           <a:p>
             <a:fld id="{483D03DC-5ED8-7A42-A55E-C10C004AFC42}" type="datetimeFigureOut">
               <a:rPr lang="es-ES" smtClean="0"/>
-              <a:t>03/08/2017</a:t>
+              <a:t>09/08/2017</a:t>
             </a:fld>
             <a:endParaRPr lang="es-ES" dirty="0"/>
           </a:p>
@@ -5728,7 +5727,7 @@
           <a:p>
             <a:fld id="{483D03DC-5ED8-7A42-A55E-C10C004AFC42}" type="datetimeFigureOut">
               <a:rPr lang="es-ES" smtClean="0"/>
-              <a:t>03/08/2017</a:t>
+              <a:t>09/08/2017</a:t>
             </a:fld>
             <a:endParaRPr lang="es-ES"/>
           </a:p>
@@ -6258,7 +6257,7 @@
           <a:p>
             <a:fld id="{483D03DC-5ED8-7A42-A55E-C10C004AFC42}" type="datetimeFigureOut">
               <a:rPr lang="es-ES" smtClean="0"/>
-              <a:t>03/08/2017</a:t>
+              <a:t>09/08/2017</a:t>
             </a:fld>
             <a:endParaRPr lang="es-ES"/>
           </a:p>
@@ -6817,7 +6816,7 @@
           <a:p>
             <a:fld id="{483D03DC-5ED8-7A42-A55E-C10C004AFC42}" type="datetimeFigureOut">
               <a:rPr lang="es-ES" smtClean="0"/>
-              <a:t>03/08/2017</a:t>
+              <a:t>09/08/2017</a:t>
             </a:fld>
             <a:endParaRPr lang="es-ES"/>
           </a:p>
@@ -10222,44 +10221,30 @@
           </a:p>
         </p:txBody>
       </p:sp>
-      <p:sp>
-        <p:nvSpPr>
-          <p:cNvPr id="5" name="CuadroTexto 4"/>
-          <p:cNvSpPr txBox="1"/>
+      <p:pic>
+        <p:nvPicPr>
+          <p:cNvPr id="2" name="Imagen 1"/>
+          <p:cNvPicPr>
+            <a:picLocks noChangeAspect="1"/>
+          </p:cNvPicPr>
           <p:nvPr/>
-        </p:nvSpPr>
-        <p:spPr>
-          <a:xfrm>
-            <a:off x="2658291" y="3285308"/>
-            <a:ext cx="4689565" cy="1417321"/>
-          </a:xfrm>
-          <a:prstGeom prst="rect">
-            <a:avLst/>
-          </a:prstGeom>
-        </p:spPr>
-        <p:txBody>
-          <a:bodyPr vert="horz" wrap="square" lIns="91440" tIns="45720" rIns="91440" bIns="45720" rtlCol="0" anchor="ctr">
-            <a:noAutofit/>
-          </a:bodyPr>
-          <a:lstStyle/>
-          <a:p>
-            <a:pPr algn="l"/>
-            <a:r>
-              <a:rPr lang="es-CO" sz="8000" b="1" dirty="0" smtClean="0">
-                <a:solidFill>
-                  <a:srgbClr val="92D050"/>
-                </a:solidFill>
-              </a:rPr>
-              <a:t>Pendiente</a:t>
-            </a:r>
-            <a:endParaRPr lang="es-CO" sz="8000" b="1" dirty="0" smtClean="0">
-              <a:solidFill>
-                <a:srgbClr val="92D050"/>
-              </a:solidFill>
-            </a:endParaRPr>
-          </a:p>
-        </p:txBody>
-      </p:sp>
+        </p:nvPicPr>
+        <p:blipFill>
+          <a:blip r:embed="rId2"/>
+          <a:stretch>
+            <a:fillRect/>
+          </a:stretch>
+        </p:blipFill>
+        <p:spPr>
+          <a:xfrm>
+            <a:off x="171450" y="1656806"/>
+            <a:ext cx="8801100" cy="4876800"/>
+          </a:xfrm>
+          <a:prstGeom prst="rect">
+            <a:avLst/>
+          </a:prstGeom>
+        </p:spPr>
+      </p:pic>
     </p:spTree>
     <p:extLst>
       <p:ext uri="{BB962C8B-B14F-4D97-AF65-F5344CB8AC3E}">
@@ -11908,6 +11893,55 @@
           </a:prstGeom>
         </p:spPr>
       </p:pic>
+      <p:sp>
+        <p:nvSpPr>
+          <p:cNvPr id="4" name="CuadroTexto 3"/>
+          <p:cNvSpPr txBox="1"/>
+          <p:nvPr/>
+        </p:nvSpPr>
+        <p:spPr>
+          <a:xfrm>
+            <a:off x="1986633" y="469556"/>
+            <a:ext cx="4950940" cy="716692"/>
+          </a:xfrm>
+          <a:prstGeom prst="rect">
+            <a:avLst/>
+          </a:prstGeom>
+        </p:spPr>
+        <p:txBody>
+          <a:bodyPr vert="horz" wrap="square" lIns="91440" tIns="45720" rIns="91440" bIns="45720" rtlCol="0" anchor="ctr">
+            <a:noAutofit/>
+          </a:bodyPr>
+          <a:lstStyle/>
+          <a:p>
+            <a:pPr algn="ctr"/>
+            <a:r>
+              <a:rPr lang="es-ES" sz="4000" b="1" dirty="0" smtClean="0">
+                <a:solidFill>
+                  <a:srgbClr val="92D050"/>
+                </a:solidFill>
+              </a:rPr>
+              <a:t>Prototipos </a:t>
+            </a:r>
+            <a:r>
+              <a:rPr lang="es-ES" sz="4000" b="1" dirty="0">
+                <a:solidFill>
+                  <a:srgbClr val="92D050"/>
+                </a:solidFill>
+              </a:rPr>
+              <a:t>n</a:t>
+            </a:r>
+            <a:r>
+              <a:rPr lang="es-ES" sz="4000" b="1" dirty="0" smtClean="0">
+                <a:solidFill>
+                  <a:srgbClr val="92D050"/>
+                </a:solidFill>
+              </a:rPr>
+              <a:t>o Funcionales</a:t>
+            </a:r>
+          </a:p>
+        </p:txBody>
+      </p:sp>
     </p:spTree>
     <p:extLst>
       <p:ext uri="{BB962C8B-B14F-4D97-AF65-F5344CB8AC3E}">
@@ -12150,6 +12184,55 @@
           </a:prstGeom>
         </p:spPr>
       </p:pic>
+      <p:sp>
+        <p:nvSpPr>
+          <p:cNvPr id="4" name="CuadroTexto 3"/>
+          <p:cNvSpPr txBox="1"/>
+          <p:nvPr/>
+        </p:nvSpPr>
+        <p:spPr>
+          <a:xfrm>
+            <a:off x="1986633" y="469556"/>
+            <a:ext cx="4950940" cy="716692"/>
+          </a:xfrm>
+          <a:prstGeom prst="rect">
+            <a:avLst/>
+          </a:prstGeom>
+        </p:spPr>
+        <p:txBody>
+          <a:bodyPr vert="horz" wrap="square" lIns="91440" tIns="45720" rIns="91440" bIns="45720" rtlCol="0" anchor="ctr">
+            <a:noAutofit/>
+          </a:bodyPr>
+          <a:lstStyle/>
+          <a:p>
+            <a:pPr algn="ctr"/>
+            <a:r>
+              <a:rPr lang="es-ES" sz="4000" b="1" dirty="0" smtClean="0">
+                <a:solidFill>
+                  <a:srgbClr val="92D050"/>
+                </a:solidFill>
+              </a:rPr>
+              <a:t>Prototipos </a:t>
+            </a:r>
+            <a:r>
+              <a:rPr lang="es-ES" sz="4000" b="1" dirty="0">
+                <a:solidFill>
+                  <a:srgbClr val="92D050"/>
+                </a:solidFill>
+              </a:rPr>
+              <a:t>n</a:t>
+            </a:r>
+            <a:r>
+              <a:rPr lang="es-ES" sz="4000" b="1" dirty="0" smtClean="0">
+                <a:solidFill>
+                  <a:srgbClr val="92D050"/>
+                </a:solidFill>
+              </a:rPr>
+              <a:t>o Funcionales</a:t>
+            </a:r>
+          </a:p>
+        </p:txBody>
+      </p:sp>
     </p:spTree>
     <p:extLst>
       <p:ext uri="{BB962C8B-B14F-4D97-AF65-F5344CB8AC3E}">
@@ -12209,8 +12292,8 @@
         </p:blipFill>
         <p:spPr>
           <a:xfrm>
-            <a:off x="370703" y="2309286"/>
-            <a:ext cx="8295503" cy="3430582"/>
+            <a:off x="161697" y="1943525"/>
+            <a:ext cx="8982303" cy="4222143"/>
           </a:xfrm>
           <a:prstGeom prst="rect">
             <a:avLst/>
@@ -12331,13 +12414,8 @@
             <a:pPr algn="ctr"/>
             <a:r>
               <a:rPr lang="es-ES" sz="4800" b="1" dirty="0" smtClean="0"/>
-              <a:t>Diagrama de </a:t>
-            </a:r>
-            <a:r>
-              <a:rPr lang="es-ES" sz="4800" b="1" dirty="0" smtClean="0"/>
-              <a:t>Componentes</a:t>
-            </a:r>
-            <a:endParaRPr lang="es-ES" sz="4800" b="1" dirty="0" smtClean="0"/>
+              <a:t>Diagrama de Componentes</a:t>
+            </a:r>
           </a:p>
         </p:txBody>
       </p:sp>
@@ -12428,7 +12506,6 @@
               <a:rPr lang="es-ES" sz="4800" b="1" dirty="0" smtClean="0"/>
               <a:t>Cuadro comparativo</a:t>
             </a:r>
-            <a:endParaRPr lang="es-ES" sz="4800" b="1" dirty="0" smtClean="0"/>
           </a:p>
         </p:txBody>
       </p:sp>
@@ -12736,8 +12813,8 @@
         </p:nvSpPr>
         <p:spPr>
           <a:xfrm>
-            <a:off x="1033847" y="1409347"/>
-            <a:ext cx="7788877" cy="5262979"/>
+            <a:off x="850967" y="2820136"/>
+            <a:ext cx="7788877" cy="954107"/>
           </a:xfrm>
           <a:prstGeom prst="rect">
             <a:avLst/>
@@ -12749,64 +12826,22 @@
           </a:bodyPr>
           <a:lstStyle/>
           <a:p>
+            <a:endParaRPr lang="es-ES" sz="2800" dirty="0"/>
+          </a:p>
+          <a:p>
+            <a:r>
+              <a:rPr lang="es-ES" sz="2800" b="1" dirty="0"/>
+              <a:t>	</a:t>
+            </a:r>
             <a:r>
               <a:rPr lang="es-ES" sz="2800" dirty="0"/>
-              <a:t>Pruebas: Utilizando una técnica que se acople</a:t>
-            </a:r>
-          </a:p>
-          <a:p>
-            <a:r>
-              <a:rPr lang="es-ES" sz="2800" dirty="0"/>
-              <a:t>	a la herramienta tecnológica según el lenguaje de</a:t>
-            </a:r>
-          </a:p>
-          <a:p>
-            <a:r>
-              <a:rPr lang="es-ES" sz="2800" dirty="0"/>
-              <a:t>	programación utilizado</a:t>
-            </a:r>
-          </a:p>
-          <a:p>
+              <a:t>	-Pruebas caja negra -Pruebas </a:t>
+            </a:r>
+            <a:r>
+              <a:rPr lang="es-ES" sz="2800" dirty="0" smtClean="0"/>
+              <a:t>regresión</a:t>
+            </a:r>
             <a:endParaRPr lang="es-ES" sz="2800" dirty="0"/>
-          </a:p>
-          <a:p>
-            <a:r>
-              <a:rPr lang="es-ES" sz="2800" b="1" dirty="0"/>
-              <a:t>	Técnicas:</a:t>
-            </a:r>
-          </a:p>
-          <a:p>
-            <a:r>
-              <a:rPr lang="es-ES" sz="2800" dirty="0"/>
-              <a:t>	-Pruebas unitarias -Pruebas de humo</a:t>
-            </a:r>
-          </a:p>
-          <a:p>
-            <a:endParaRPr lang="es-ES" sz="2800" dirty="0"/>
-          </a:p>
-          <a:p>
-            <a:r>
-              <a:rPr lang="es-ES" sz="2800" dirty="0"/>
-              <a:t>	-Pruebas caja negra -Pruebas regresión</a:t>
-            </a:r>
-          </a:p>
-          <a:p>
-            <a:endParaRPr lang="es-ES" sz="2800" dirty="0"/>
-          </a:p>
-          <a:p>
-            <a:r>
-              <a:rPr lang="es-ES" sz="2800" dirty="0"/>
-              <a:t>	-Pruebas caja blanca -Pruebas del sistema</a:t>
-            </a:r>
-          </a:p>
-          <a:p>
-            <a:endParaRPr lang="es-ES" sz="2800" dirty="0"/>
-          </a:p>
-          <a:p>
-            <a:r>
-              <a:rPr lang="es-ES" sz="2800" dirty="0"/>
-              <a:t>	-Pruebas funcionales -Pruebas de stress</a:t>
-            </a:r>
           </a:p>
         </p:txBody>
       </p:sp>
@@ -13247,8 +13282,8 @@
         </p:nvSpPr>
         <p:spPr>
           <a:xfrm>
-            <a:off x="2657331" y="3183924"/>
-            <a:ext cx="4368312" cy="646331"/>
+            <a:off x="2448325" y="519101"/>
+            <a:ext cx="4940583" cy="707886"/>
           </a:xfrm>
           <a:prstGeom prst="rect">
             <a:avLst/>
@@ -13261,9 +13296,61 @@
           <a:lstStyle/>
           <a:p>
             <a:r>
-              <a:rPr lang="es-ES" sz="3600" dirty="0"/>
+              <a:rPr lang="es-ES" sz="4000" b="1" dirty="0"/>
               <a:t>Contratos de Software</a:t>
             </a:r>
+          </a:p>
+        </p:txBody>
+      </p:sp>
+      <p:sp>
+        <p:nvSpPr>
+          <p:cNvPr id="3" name="Esquina doblada 2">
+            <a:hlinkClick r:id="rId2" action="ppaction://hlinkfile"/>
+          </p:cNvPr>
+          <p:cNvSpPr/>
+          <p:nvPr/>
+        </p:nvSpPr>
+        <p:spPr>
+          <a:xfrm>
+            <a:off x="3698812" y="2385812"/>
+            <a:ext cx="2253803" cy="1880315"/>
+          </a:xfrm>
+          <a:prstGeom prst="foldedCorner">
+            <a:avLst/>
+          </a:prstGeom>
+        </p:spPr>
+        <p:style>
+          <a:lnRef idx="1">
+            <a:schemeClr val="accent1"/>
+          </a:lnRef>
+          <a:fillRef idx="3">
+            <a:schemeClr val="accent1"/>
+          </a:fillRef>
+          <a:effectRef idx="2">
+            <a:schemeClr val="accent1"/>
+          </a:effectRef>
+          <a:fontRef idx="minor">
+            <a:schemeClr val="lt1"/>
+          </a:fontRef>
+        </p:style>
+        <p:txBody>
+          <a:bodyPr rtlCol="0" anchor="ctr"/>
+          <a:lstStyle/>
+          <a:p>
+            <a:pPr algn="ctr"/>
+            <a:r>
+              <a:rPr lang="es-CO" b="1" dirty="0" smtClean="0">
+                <a:solidFill>
+                  <a:schemeClr val="tx1"/>
+                </a:solidFill>
+              </a:rPr>
+              <a:t>Contrato</a:t>
+            </a:r>
+            <a:endParaRPr lang="es-CO" b="1" dirty="0">
+              <a:solidFill>
+                <a:schemeClr val="tx1"/>
+              </a:solidFill>
+            </a:endParaRPr>
           </a:p>
         </p:txBody>
       </p:sp>
@@ -13640,86 +13727,6 @@
     <p:extLst>
       <p:ext uri="{BB962C8B-B14F-4D97-AF65-F5344CB8AC3E}">
         <p14:creationId xmlns:p14="http://schemas.microsoft.com/office/powerpoint/2010/main" val="293882207"/>
-      </p:ext>
-    </p:extLst>
-  </p:cSld>
-  <p:clrMapOvr>
-    <a:masterClrMapping/>
-  </p:clrMapOvr>
-  <p:timing>
-    <p:tnLst>
-      <p:par>
-        <p:cTn id="1" dur="indefinite" restart="never" nodeType="tmRoot"/>
-      </p:par>
-    </p:tnLst>
-  </p:timing>
-</p:sld>
-</file>
-
-<file path=ppt/slides/slide52.xml><?xml version="1.0" encoding="utf-8"?>
-<p:sld xmlns:a="http://schemas.openxmlformats.org/drawingml/2006/main" xmlns:r="http://schemas.openxmlformats.org/officeDocument/2006/relationships" xmlns:p="http://schemas.openxmlformats.org/presentationml/2006/main">
-  <p:cSld>
-    <p:spTree>
-      <p:nvGrpSpPr>
-        <p:cNvPr id="1" name=""/>
-        <p:cNvGrpSpPr/>
-        <p:nvPr/>
-      </p:nvGrpSpPr>
-      <p:grpSpPr>
-        <a:xfrm>
-          <a:off x="0" y="0"/>
-          <a:ext cx="0" cy="0"/>
-          <a:chOff x="0" y="0"/>
-          <a:chExt cx="0" cy="0"/>
-        </a:xfrm>
-      </p:grpSpPr>
-      <p:sp>
-        <p:nvSpPr>
-          <p:cNvPr id="2" name="Rectángulo 1"/>
-          <p:cNvSpPr/>
-          <p:nvPr/>
-        </p:nvSpPr>
-        <p:spPr>
-          <a:xfrm>
-            <a:off x="1849394" y="2337654"/>
-            <a:ext cx="5564659" cy="3108543"/>
-          </a:xfrm>
-          <a:prstGeom prst="rect">
-            <a:avLst/>
-          </a:prstGeom>
-        </p:spPr>
-        <p:txBody>
-          <a:bodyPr wrap="square">
-            <a:spAutoFit/>
-          </a:bodyPr>
-          <a:lstStyle/>
-          <a:p>
-            <a:r>
-              <a:rPr lang="es-ES" sz="2800" dirty="0"/>
-              <a:t>Implementación del diagrama de distribución</a:t>
-            </a:r>
-          </a:p>
-          <a:p>
-            <a:endParaRPr lang="es-ES" sz="2800" dirty="0"/>
-          </a:p>
-          <a:p>
-            <a:r>
-              <a:rPr lang="es-ES" sz="2800" dirty="0"/>
-              <a:t>	- Despliegue de la aplicación en un servidor</a:t>
-            </a:r>
-          </a:p>
-          <a:p>
-            <a:r>
-              <a:rPr lang="es-ES" sz="2800" dirty="0"/>
-              <a:t>	dependiendo del lenguaje de programación</a:t>
-            </a:r>
-          </a:p>
-        </p:txBody>
-      </p:sp>
-    </p:spTree>
-    <p:extLst>
-      <p:ext uri="{BB962C8B-B14F-4D97-AF65-F5344CB8AC3E}">
-        <p14:creationId xmlns:p14="http://schemas.microsoft.com/office/powerpoint/2010/main" val="4108471876"/>
       </p:ext>
     </p:extLst>
   </p:cSld>

</xml_diff>